<commit_message>
Minor bug fixes Actualized data to sept 28 al 12 gmt
</commit_message>
<xml_diff>
--- a/Training-material/day 2/07a_bootcamp-part2.pptx
+++ b/Training-material/day 2/07a_bootcamp-part2.pptx
@@ -41,13 +41,6 @@
       <p:bold r:id="rId23"/>
       <p:italic r:id="rId24"/>
       <p:boldItalic r:id="rId25"/>
-    </p:embeddedFont>
-    <p:embeddedFont>
-      <p:font typeface="Helvetica Neue Light"/>
-      <p:regular r:id="rId26"/>
-      <p:bold r:id="rId27"/>
-      <p:italic r:id="rId28"/>
-      <p:boldItalic r:id="rId29"/>
     </p:embeddedFont>
   </p:embeddedFontLst>
   <p:defaultTextStyle>
@@ -281,7 +274,7 @@
   </p:defaultTextStyle>
   <p:extLst>
     <p:ext uri="http://customooxmlschemas.google.com/">
-      <go:slidesCustomData xmlns:go="http://customooxmlschemas.google.com/" r:id="rId30" roundtripDataSignature="AMtx7mgiGE/170XbVCvKSifbc7PBaN7P3Q=="/>
+      <go:slidesCustomData xmlns:go="http://customooxmlschemas.google.com/" r:id="rId26" roundtripDataSignature="AMtx7mh1lZo7ysYt352NvYN+h7EObNOLYg=="/>
     </p:ext>
   </p:extLst>
 </p:presentation>
@@ -377,15 +370,25 @@
           </a:bodyPr>
           <a:lstStyle>
             <a:lvl1pPr indent="-228600" lvl="0" marL="457200" marR="0" rtl="0" algn="l">
-              <a:spcBef>
-                <a:spcPts val="0"/>
-              </a:spcBef>
-              <a:spcAft>
-                <a:spcPts val="0"/>
-              </a:spcAft>
+              <a:lnSpc>
+                <a:spcPct val="100000"/>
+              </a:lnSpc>
+              <a:spcBef>
+                <a:spcPts val="0"/>
+              </a:spcBef>
+              <a:spcAft>
+                <a:spcPts val="0"/>
+              </a:spcAft>
+              <a:buClr>
+                <a:srgbClr val="000000"/>
+              </a:buClr>
               <a:buSzPts val="1400"/>
+              <a:buFont typeface="Arial"/>
               <a:buNone/>
               <a:defRPr b="0" i="0" sz="1400" u="none" cap="none" strike="noStrike">
+                <a:solidFill>
+                  <a:srgbClr val="000000"/>
+                </a:solidFill>
                 <a:latin typeface="Arial"/>
                 <a:ea typeface="Arial"/>
                 <a:cs typeface="Arial"/>
@@ -393,15 +396,25 @@
               </a:defRPr>
             </a:lvl1pPr>
             <a:lvl2pPr indent="-228600" lvl="1" marL="914400" marR="0" rtl="0" algn="l">
-              <a:spcBef>
-                <a:spcPts val="0"/>
-              </a:spcBef>
-              <a:spcAft>
-                <a:spcPts val="0"/>
-              </a:spcAft>
+              <a:lnSpc>
+                <a:spcPct val="100000"/>
+              </a:lnSpc>
+              <a:spcBef>
+                <a:spcPts val="0"/>
+              </a:spcBef>
+              <a:spcAft>
+                <a:spcPts val="0"/>
+              </a:spcAft>
+              <a:buClr>
+                <a:srgbClr val="000000"/>
+              </a:buClr>
               <a:buSzPts val="1400"/>
+              <a:buFont typeface="Arial"/>
               <a:buNone/>
               <a:defRPr b="0" i="0" sz="1400" u="none" cap="none" strike="noStrike">
+                <a:solidFill>
+                  <a:srgbClr val="000000"/>
+                </a:solidFill>
                 <a:latin typeface="Arial"/>
                 <a:ea typeface="Arial"/>
                 <a:cs typeface="Arial"/>
@@ -409,15 +422,25 @@
               </a:defRPr>
             </a:lvl2pPr>
             <a:lvl3pPr indent="-228600" lvl="2" marL="1371600" marR="0" rtl="0" algn="l">
-              <a:spcBef>
-                <a:spcPts val="0"/>
-              </a:spcBef>
-              <a:spcAft>
-                <a:spcPts val="0"/>
-              </a:spcAft>
+              <a:lnSpc>
+                <a:spcPct val="100000"/>
+              </a:lnSpc>
+              <a:spcBef>
+                <a:spcPts val="0"/>
+              </a:spcBef>
+              <a:spcAft>
+                <a:spcPts val="0"/>
+              </a:spcAft>
+              <a:buClr>
+                <a:srgbClr val="000000"/>
+              </a:buClr>
               <a:buSzPts val="1400"/>
+              <a:buFont typeface="Arial"/>
               <a:buNone/>
               <a:defRPr b="0" i="0" sz="1400" u="none" cap="none" strike="noStrike">
+                <a:solidFill>
+                  <a:srgbClr val="000000"/>
+                </a:solidFill>
                 <a:latin typeface="Arial"/>
                 <a:ea typeface="Arial"/>
                 <a:cs typeface="Arial"/>
@@ -425,15 +448,25 @@
               </a:defRPr>
             </a:lvl3pPr>
             <a:lvl4pPr indent="-228600" lvl="3" marL="1828800" marR="0" rtl="0" algn="l">
-              <a:spcBef>
-                <a:spcPts val="0"/>
-              </a:spcBef>
-              <a:spcAft>
-                <a:spcPts val="0"/>
-              </a:spcAft>
+              <a:lnSpc>
+                <a:spcPct val="100000"/>
+              </a:lnSpc>
+              <a:spcBef>
+                <a:spcPts val="0"/>
+              </a:spcBef>
+              <a:spcAft>
+                <a:spcPts val="0"/>
+              </a:spcAft>
+              <a:buClr>
+                <a:srgbClr val="000000"/>
+              </a:buClr>
               <a:buSzPts val="1400"/>
+              <a:buFont typeface="Arial"/>
               <a:buNone/>
               <a:defRPr b="0" i="0" sz="1400" u="none" cap="none" strike="noStrike">
+                <a:solidFill>
+                  <a:srgbClr val="000000"/>
+                </a:solidFill>
                 <a:latin typeface="Arial"/>
                 <a:ea typeface="Arial"/>
                 <a:cs typeface="Arial"/>
@@ -441,15 +474,25 @@
               </a:defRPr>
             </a:lvl4pPr>
             <a:lvl5pPr indent="-228600" lvl="4" marL="2286000" marR="0" rtl="0" algn="l">
-              <a:spcBef>
-                <a:spcPts val="0"/>
-              </a:spcBef>
-              <a:spcAft>
-                <a:spcPts val="0"/>
-              </a:spcAft>
+              <a:lnSpc>
+                <a:spcPct val="100000"/>
+              </a:lnSpc>
+              <a:spcBef>
+                <a:spcPts val="0"/>
+              </a:spcBef>
+              <a:spcAft>
+                <a:spcPts val="0"/>
+              </a:spcAft>
+              <a:buClr>
+                <a:srgbClr val="000000"/>
+              </a:buClr>
               <a:buSzPts val="1400"/>
+              <a:buFont typeface="Arial"/>
               <a:buNone/>
               <a:defRPr b="0" i="0" sz="1400" u="none" cap="none" strike="noStrike">
+                <a:solidFill>
+                  <a:srgbClr val="000000"/>
+                </a:solidFill>
                 <a:latin typeface="Arial"/>
                 <a:ea typeface="Arial"/>
                 <a:cs typeface="Arial"/>
@@ -457,15 +500,25 @@
               </a:defRPr>
             </a:lvl5pPr>
             <a:lvl6pPr indent="-228600" lvl="5" marL="2743200" marR="0" rtl="0" algn="l">
-              <a:spcBef>
-                <a:spcPts val="0"/>
-              </a:spcBef>
-              <a:spcAft>
-                <a:spcPts val="0"/>
-              </a:spcAft>
+              <a:lnSpc>
+                <a:spcPct val="100000"/>
+              </a:lnSpc>
+              <a:spcBef>
+                <a:spcPts val="0"/>
+              </a:spcBef>
+              <a:spcAft>
+                <a:spcPts val="0"/>
+              </a:spcAft>
+              <a:buClr>
+                <a:srgbClr val="000000"/>
+              </a:buClr>
               <a:buSzPts val="1400"/>
+              <a:buFont typeface="Arial"/>
               <a:buNone/>
               <a:defRPr b="0" i="0" sz="1400" u="none" cap="none" strike="noStrike">
+                <a:solidFill>
+                  <a:srgbClr val="000000"/>
+                </a:solidFill>
                 <a:latin typeface="Arial"/>
                 <a:ea typeface="Arial"/>
                 <a:cs typeface="Arial"/>
@@ -473,15 +526,25 @@
               </a:defRPr>
             </a:lvl6pPr>
             <a:lvl7pPr indent="-228600" lvl="6" marL="3200400" marR="0" rtl="0" algn="l">
-              <a:spcBef>
-                <a:spcPts val="0"/>
-              </a:spcBef>
-              <a:spcAft>
-                <a:spcPts val="0"/>
-              </a:spcAft>
+              <a:lnSpc>
+                <a:spcPct val="100000"/>
+              </a:lnSpc>
+              <a:spcBef>
+                <a:spcPts val="0"/>
+              </a:spcBef>
+              <a:spcAft>
+                <a:spcPts val="0"/>
+              </a:spcAft>
+              <a:buClr>
+                <a:srgbClr val="000000"/>
+              </a:buClr>
               <a:buSzPts val="1400"/>
+              <a:buFont typeface="Arial"/>
               <a:buNone/>
               <a:defRPr b="0" i="0" sz="1400" u="none" cap="none" strike="noStrike">
+                <a:solidFill>
+                  <a:srgbClr val="000000"/>
+                </a:solidFill>
                 <a:latin typeface="Arial"/>
                 <a:ea typeface="Arial"/>
                 <a:cs typeface="Arial"/>
@@ -489,15 +552,25 @@
               </a:defRPr>
             </a:lvl7pPr>
             <a:lvl8pPr indent="-228600" lvl="7" marL="3657600" marR="0" rtl="0" algn="l">
-              <a:spcBef>
-                <a:spcPts val="0"/>
-              </a:spcBef>
-              <a:spcAft>
-                <a:spcPts val="0"/>
-              </a:spcAft>
+              <a:lnSpc>
+                <a:spcPct val="100000"/>
+              </a:lnSpc>
+              <a:spcBef>
+                <a:spcPts val="0"/>
+              </a:spcBef>
+              <a:spcAft>
+                <a:spcPts val="0"/>
+              </a:spcAft>
+              <a:buClr>
+                <a:srgbClr val="000000"/>
+              </a:buClr>
               <a:buSzPts val="1400"/>
+              <a:buFont typeface="Arial"/>
               <a:buNone/>
               <a:defRPr b="0" i="0" sz="1400" u="none" cap="none" strike="noStrike">
+                <a:solidFill>
+                  <a:srgbClr val="000000"/>
+                </a:solidFill>
                 <a:latin typeface="Arial"/>
                 <a:ea typeface="Arial"/>
                 <a:cs typeface="Arial"/>
@@ -505,15 +578,25 @@
               </a:defRPr>
             </a:lvl8pPr>
             <a:lvl9pPr indent="-228600" lvl="8" marL="4114800" marR="0" rtl="0" algn="l">
-              <a:spcBef>
-                <a:spcPts val="0"/>
-              </a:spcBef>
-              <a:spcAft>
-                <a:spcPts val="0"/>
-              </a:spcAft>
+              <a:lnSpc>
+                <a:spcPct val="100000"/>
+              </a:lnSpc>
+              <a:spcBef>
+                <a:spcPts val="0"/>
+              </a:spcBef>
+              <a:spcAft>
+                <a:spcPts val="0"/>
+              </a:spcAft>
+              <a:buClr>
+                <a:srgbClr val="000000"/>
+              </a:buClr>
               <a:buSzPts val="1400"/>
+              <a:buFont typeface="Arial"/>
               <a:buNone/>
               <a:defRPr b="0" i="0" sz="1400" u="none" cap="none" strike="noStrike">
+                <a:solidFill>
+                  <a:srgbClr val="000000"/>
+                </a:solidFill>
                 <a:latin typeface="Arial"/>
                 <a:ea typeface="Arial"/>
                 <a:cs typeface="Arial"/>
@@ -792,6 +875,10 @@
           <a:prstGeom prst="rect">
             <a:avLst/>
           </a:prstGeom>
+          <a:noFill/>
+          <a:ln>
+            <a:noFill/>
+          </a:ln>
         </p:spPr>
         <p:txBody>
           <a:bodyPr anchorCtr="0" anchor="t" bIns="45700" lIns="91425" spcFirstLastPara="1" rIns="91425" wrap="square" tIns="45700">
@@ -800,12 +887,16 @@
           <a:lstStyle/>
           <a:p>
             <a:pPr indent="0" lvl="0" marL="0" rtl="0" algn="l">
-              <a:spcBef>
-                <a:spcPts val="0"/>
-              </a:spcBef>
-              <a:spcAft>
-                <a:spcPts val="0"/>
-              </a:spcAft>
+              <a:lnSpc>
+                <a:spcPct val="100000"/>
+              </a:lnSpc>
+              <a:spcBef>
+                <a:spcPts val="0"/>
+              </a:spcBef>
+              <a:spcAft>
+                <a:spcPts val="0"/>
+              </a:spcAft>
+              <a:buSzPts val="1400"/>
               <a:buNone/>
             </a:pPr>
             <a:r>
@@ -848,6 +939,10 @@
               </a:path>
             </a:pathLst>
           </a:custGeom>
+          <a:noFill/>
+          <a:ln>
+            <a:noFill/>
+          </a:ln>
         </p:spPr>
       </p:sp>
     </p:spTree>
@@ -891,6 +986,10 @@
           <a:prstGeom prst="rect">
             <a:avLst/>
           </a:prstGeom>
+          <a:noFill/>
+          <a:ln>
+            <a:noFill/>
+          </a:ln>
         </p:spPr>
         <p:txBody>
           <a:bodyPr anchorCtr="0" anchor="t" bIns="45700" lIns="91425" spcFirstLastPara="1" rIns="91425" wrap="square" tIns="45700">
@@ -899,12 +998,16 @@
           <a:lstStyle/>
           <a:p>
             <a:pPr indent="0" lvl="0" marL="0" rtl="0" algn="l">
-              <a:spcBef>
-                <a:spcPts val="0"/>
-              </a:spcBef>
-              <a:spcAft>
-                <a:spcPts val="0"/>
-              </a:spcAft>
+              <a:lnSpc>
+                <a:spcPct val="100000"/>
+              </a:lnSpc>
+              <a:spcBef>
+                <a:spcPts val="0"/>
+              </a:spcBef>
+              <a:spcAft>
+                <a:spcPts val="0"/>
+              </a:spcAft>
+              <a:buSzPts val="1400"/>
               <a:buNone/>
             </a:pPr>
             <a:r>
@@ -947,6 +1050,10 @@
               </a:path>
             </a:pathLst>
           </a:custGeom>
+          <a:noFill/>
+          <a:ln>
+            <a:noFill/>
+          </a:ln>
         </p:spPr>
       </p:sp>
     </p:spTree>
@@ -990,6 +1097,10 @@
           <a:prstGeom prst="rect">
             <a:avLst/>
           </a:prstGeom>
+          <a:noFill/>
+          <a:ln>
+            <a:noFill/>
+          </a:ln>
         </p:spPr>
         <p:txBody>
           <a:bodyPr anchorCtr="0" anchor="t" bIns="45700" lIns="91425" spcFirstLastPara="1" rIns="91425" wrap="square" tIns="45700">
@@ -998,12 +1109,16 @@
           <a:lstStyle/>
           <a:p>
             <a:pPr indent="0" lvl="0" marL="0" rtl="0" algn="l">
-              <a:spcBef>
-                <a:spcPts val="0"/>
-              </a:spcBef>
-              <a:spcAft>
-                <a:spcPts val="0"/>
-              </a:spcAft>
+              <a:lnSpc>
+                <a:spcPct val="100000"/>
+              </a:lnSpc>
+              <a:spcBef>
+                <a:spcPts val="0"/>
+              </a:spcBef>
+              <a:spcAft>
+                <a:spcPts val="0"/>
+              </a:spcAft>
+              <a:buSzPts val="1400"/>
               <a:buNone/>
             </a:pPr>
             <a:r>
@@ -1046,6 +1161,10 @@
               </a:path>
             </a:pathLst>
           </a:custGeom>
+          <a:noFill/>
+          <a:ln>
+            <a:noFill/>
+          </a:ln>
         </p:spPr>
       </p:sp>
     </p:spTree>
@@ -1089,6 +1208,10 @@
           <a:prstGeom prst="rect">
             <a:avLst/>
           </a:prstGeom>
+          <a:noFill/>
+          <a:ln>
+            <a:noFill/>
+          </a:ln>
         </p:spPr>
         <p:txBody>
           <a:bodyPr anchorCtr="0" anchor="t" bIns="45700" lIns="91425" spcFirstLastPara="1" rIns="91425" wrap="square" tIns="45700">
@@ -1097,12 +1220,16 @@
           <a:lstStyle/>
           <a:p>
             <a:pPr indent="0" lvl="0" marL="0" rtl="0" algn="l">
-              <a:spcBef>
-                <a:spcPts val="0"/>
-              </a:spcBef>
-              <a:spcAft>
-                <a:spcPts val="0"/>
-              </a:spcAft>
+              <a:lnSpc>
+                <a:spcPct val="100000"/>
+              </a:lnSpc>
+              <a:spcBef>
+                <a:spcPts val="0"/>
+              </a:spcBef>
+              <a:spcAft>
+                <a:spcPts val="0"/>
+              </a:spcAft>
+              <a:buSzPts val="1400"/>
               <a:buNone/>
             </a:pPr>
             <a:r>
@@ -1145,6 +1272,10 @@
               </a:path>
             </a:pathLst>
           </a:custGeom>
+          <a:noFill/>
+          <a:ln>
+            <a:noFill/>
+          </a:ln>
         </p:spPr>
       </p:sp>
     </p:spTree>
@@ -1188,6 +1319,10 @@
           <a:prstGeom prst="rect">
             <a:avLst/>
           </a:prstGeom>
+          <a:noFill/>
+          <a:ln>
+            <a:noFill/>
+          </a:ln>
         </p:spPr>
         <p:txBody>
           <a:bodyPr anchorCtr="0" anchor="t" bIns="45700" lIns="91425" spcFirstLastPara="1" rIns="91425" wrap="square" tIns="45700">
@@ -1196,12 +1331,16 @@
           <a:lstStyle/>
           <a:p>
             <a:pPr indent="0" lvl="0" marL="0" rtl="0" algn="l">
-              <a:spcBef>
-                <a:spcPts val="0"/>
-              </a:spcBef>
-              <a:spcAft>
-                <a:spcPts val="0"/>
-              </a:spcAft>
+              <a:lnSpc>
+                <a:spcPct val="100000"/>
+              </a:lnSpc>
+              <a:spcBef>
+                <a:spcPts val="0"/>
+              </a:spcBef>
+              <a:spcAft>
+                <a:spcPts val="0"/>
+              </a:spcAft>
+              <a:buSzPts val="1400"/>
               <a:buNone/>
             </a:pPr>
             <a:r>
@@ -1244,6 +1383,10 @@
               </a:path>
             </a:pathLst>
           </a:custGeom>
+          <a:noFill/>
+          <a:ln>
+            <a:noFill/>
+          </a:ln>
         </p:spPr>
       </p:sp>
     </p:spTree>
@@ -1287,6 +1430,10 @@
           <a:prstGeom prst="rect">
             <a:avLst/>
           </a:prstGeom>
+          <a:noFill/>
+          <a:ln>
+            <a:noFill/>
+          </a:ln>
         </p:spPr>
         <p:txBody>
           <a:bodyPr anchorCtr="0" anchor="t" bIns="45700" lIns="91425" spcFirstLastPara="1" rIns="91425" wrap="square" tIns="45700">
@@ -1295,12 +1442,16 @@
           <a:lstStyle/>
           <a:p>
             <a:pPr indent="0" lvl="0" marL="0" rtl="0" algn="l">
-              <a:spcBef>
-                <a:spcPts val="0"/>
-              </a:spcBef>
-              <a:spcAft>
-                <a:spcPts val="0"/>
-              </a:spcAft>
+              <a:lnSpc>
+                <a:spcPct val="100000"/>
+              </a:lnSpc>
+              <a:spcBef>
+                <a:spcPts val="0"/>
+              </a:spcBef>
+              <a:spcAft>
+                <a:spcPts val="0"/>
+              </a:spcAft>
+              <a:buSzPts val="1400"/>
               <a:buNone/>
             </a:pPr>
             <a:r>
@@ -1343,6 +1494,10 @@
               </a:path>
             </a:pathLst>
           </a:custGeom>
+          <a:noFill/>
+          <a:ln>
+            <a:noFill/>
+          </a:ln>
         </p:spPr>
       </p:sp>
     </p:spTree>
@@ -1386,6 +1541,10 @@
           <a:prstGeom prst="rect">
             <a:avLst/>
           </a:prstGeom>
+          <a:noFill/>
+          <a:ln>
+            <a:noFill/>
+          </a:ln>
         </p:spPr>
         <p:txBody>
           <a:bodyPr anchorCtr="0" anchor="t" bIns="45700" lIns="91425" spcFirstLastPara="1" rIns="91425" wrap="square" tIns="45700">
@@ -1394,12 +1553,16 @@
           <a:lstStyle/>
           <a:p>
             <a:pPr indent="0" lvl="0" marL="0" rtl="0" algn="l">
-              <a:spcBef>
-                <a:spcPts val="0"/>
-              </a:spcBef>
-              <a:spcAft>
-                <a:spcPts val="0"/>
-              </a:spcAft>
+              <a:lnSpc>
+                <a:spcPct val="100000"/>
+              </a:lnSpc>
+              <a:spcBef>
+                <a:spcPts val="0"/>
+              </a:spcBef>
+              <a:spcAft>
+                <a:spcPts val="0"/>
+              </a:spcAft>
+              <a:buSzPts val="1400"/>
               <a:buNone/>
             </a:pPr>
             <a:r>
@@ -1442,6 +1605,10 @@
               </a:path>
             </a:pathLst>
           </a:custGeom>
+          <a:noFill/>
+          <a:ln>
+            <a:noFill/>
+          </a:ln>
         </p:spPr>
       </p:sp>
     </p:spTree>
@@ -1485,6 +1652,10 @@
           <a:prstGeom prst="rect">
             <a:avLst/>
           </a:prstGeom>
+          <a:noFill/>
+          <a:ln>
+            <a:noFill/>
+          </a:ln>
         </p:spPr>
         <p:txBody>
           <a:bodyPr anchorCtr="0" anchor="t" bIns="45700" lIns="91425" spcFirstLastPara="1" rIns="91425" wrap="square" tIns="45700">
@@ -1493,12 +1664,16 @@
           <a:lstStyle/>
           <a:p>
             <a:pPr indent="0" lvl="0" marL="0" rtl="0" algn="l">
-              <a:spcBef>
-                <a:spcPts val="0"/>
-              </a:spcBef>
-              <a:spcAft>
-                <a:spcPts val="0"/>
-              </a:spcAft>
+              <a:lnSpc>
+                <a:spcPct val="100000"/>
+              </a:lnSpc>
+              <a:spcBef>
+                <a:spcPts val="0"/>
+              </a:spcBef>
+              <a:spcAft>
+                <a:spcPts val="0"/>
+              </a:spcAft>
+              <a:buSzPts val="1400"/>
               <a:buNone/>
             </a:pPr>
             <a:r>
@@ -1541,6 +1716,10 @@
               </a:path>
             </a:pathLst>
           </a:custGeom>
+          <a:noFill/>
+          <a:ln>
+            <a:noFill/>
+          </a:ln>
         </p:spPr>
       </p:sp>
     </p:spTree>
@@ -1584,6 +1763,10 @@
           <a:prstGeom prst="rect">
             <a:avLst/>
           </a:prstGeom>
+          <a:noFill/>
+          <a:ln>
+            <a:noFill/>
+          </a:ln>
         </p:spPr>
         <p:txBody>
           <a:bodyPr anchorCtr="0" anchor="t" bIns="45700" lIns="91425" spcFirstLastPara="1" rIns="91425" wrap="square" tIns="45700">
@@ -1592,12 +1775,16 @@
           <a:lstStyle/>
           <a:p>
             <a:pPr indent="0" lvl="0" marL="0" rtl="0" algn="l">
-              <a:spcBef>
-                <a:spcPts val="0"/>
-              </a:spcBef>
-              <a:spcAft>
-                <a:spcPts val="0"/>
-              </a:spcAft>
+              <a:lnSpc>
+                <a:spcPct val="100000"/>
+              </a:lnSpc>
+              <a:spcBef>
+                <a:spcPts val="0"/>
+              </a:spcBef>
+              <a:spcAft>
+                <a:spcPts val="0"/>
+              </a:spcAft>
+              <a:buSzPts val="1400"/>
               <a:buNone/>
             </a:pPr>
             <a:r>
@@ -1640,6 +1827,10 @@
               </a:path>
             </a:pathLst>
           </a:custGeom>
+          <a:noFill/>
+          <a:ln>
+            <a:noFill/>
+          </a:ln>
         </p:spPr>
       </p:sp>
     </p:spTree>
@@ -1979,7 +2170,7 @@
           <a:ln cap="flat" cmpd="sng" w="9525">
             <a:solidFill>
               <a:srgbClr val="FFFFFF">
-                <a:alpha val="50980"/>
+                <a:alpha val="50588"/>
               </a:srgbClr>
             </a:solidFill>
             <a:prstDash val="solid"/>
@@ -2448,7 +2639,7 @@
                 <a:srgbClr val="2C2C38"/>
               </a:buClr>
               <a:buSzPts val="1800"/>
-              <a:buChar char="▫︎"/>
+              <a:buChar char="▫"/>
               <a:defRPr/>
             </a:lvl4pPr>
             <a:lvl5pPr lvl="4" algn="l">
@@ -2615,7 +2806,7 @@
           <a:ln cap="flat" cmpd="sng" w="9525">
             <a:solidFill>
               <a:schemeClr val="lt1">
-                <a:alpha val="50980"/>
+                <a:alpha val="50588"/>
               </a:schemeClr>
             </a:solidFill>
             <a:prstDash val="solid"/>
@@ -2716,7 +2907,7 @@
                 <a:srgbClr val="2C2C38"/>
               </a:buClr>
               <a:buSzPts val="1800"/>
-              <a:buChar char="▫︎"/>
+              <a:buChar char="▫"/>
               <a:defRPr/>
             </a:lvl4pPr>
             <a:lvl5pPr indent="-342900" lvl="4" marL="2286000" algn="l">
@@ -2892,7 +3083,10 @@
                 <a:sym typeface="Rubik"/>
               </a:defRPr>
             </a:lvl1pPr>
-            <a:lvl2pPr lvl="1">
+            <a:lvl2pPr lvl="1" algn="l">
+              <a:lnSpc>
+                <a:spcPct val="100000"/>
+              </a:lnSpc>
               <a:spcBef>
                 <a:spcPts val="0"/>
               </a:spcBef>
@@ -2903,7 +3097,10 @@
               <a:buNone/>
               <a:defRPr/>
             </a:lvl2pPr>
-            <a:lvl3pPr lvl="2">
+            <a:lvl3pPr lvl="2" algn="l">
+              <a:lnSpc>
+                <a:spcPct val="100000"/>
+              </a:lnSpc>
               <a:spcBef>
                 <a:spcPts val="0"/>
               </a:spcBef>
@@ -2914,7 +3111,10 @@
               <a:buNone/>
               <a:defRPr/>
             </a:lvl3pPr>
-            <a:lvl4pPr lvl="3">
+            <a:lvl4pPr lvl="3" algn="l">
+              <a:lnSpc>
+                <a:spcPct val="100000"/>
+              </a:lnSpc>
               <a:spcBef>
                 <a:spcPts val="0"/>
               </a:spcBef>
@@ -2925,7 +3125,10 @@
               <a:buNone/>
               <a:defRPr/>
             </a:lvl4pPr>
-            <a:lvl5pPr lvl="4">
+            <a:lvl5pPr lvl="4" algn="l">
+              <a:lnSpc>
+                <a:spcPct val="100000"/>
+              </a:lnSpc>
               <a:spcBef>
                 <a:spcPts val="0"/>
               </a:spcBef>
@@ -2936,7 +3139,10 @@
               <a:buNone/>
               <a:defRPr/>
             </a:lvl5pPr>
-            <a:lvl6pPr lvl="5">
+            <a:lvl6pPr lvl="5" algn="l">
+              <a:lnSpc>
+                <a:spcPct val="100000"/>
+              </a:lnSpc>
               <a:spcBef>
                 <a:spcPts val="0"/>
               </a:spcBef>
@@ -2947,7 +3153,10 @@
               <a:buNone/>
               <a:defRPr/>
             </a:lvl6pPr>
-            <a:lvl7pPr lvl="6">
+            <a:lvl7pPr lvl="6" algn="l">
+              <a:lnSpc>
+                <a:spcPct val="100000"/>
+              </a:lnSpc>
               <a:spcBef>
                 <a:spcPts val="0"/>
               </a:spcBef>
@@ -2958,7 +3167,10 @@
               <a:buNone/>
               <a:defRPr/>
             </a:lvl7pPr>
-            <a:lvl8pPr lvl="7">
+            <a:lvl8pPr lvl="7" algn="l">
+              <a:lnSpc>
+                <a:spcPct val="100000"/>
+              </a:lnSpc>
               <a:spcBef>
                 <a:spcPts val="0"/>
               </a:spcBef>
@@ -2969,7 +3181,10 @@
               <a:buNone/>
               <a:defRPr/>
             </a:lvl8pPr>
-            <a:lvl9pPr lvl="8">
+            <a:lvl9pPr lvl="8" algn="l">
+              <a:lnSpc>
+                <a:spcPct val="100000"/>
+              </a:lnSpc>
               <a:spcBef>
                 <a:spcPts val="0"/>
               </a:spcBef>
@@ -3100,7 +3315,7 @@
                 <a:schemeClr val="dk1"/>
               </a:buClr>
               <a:buSzPts val="1350"/>
-              <a:buChar char="▫︎"/>
+              <a:buChar char="▫"/>
               <a:defRPr>
                 <a:solidFill>
                   <a:schemeClr val="dk1"/>
@@ -3436,7 +3651,7 @@
                 <a:srgbClr val="2C2C38"/>
               </a:buClr>
               <a:buSzPts val="1800"/>
-              <a:buChar char="▫︎"/>
+              <a:buChar char="▫"/>
               <a:defRPr/>
             </a:lvl4pPr>
             <a:lvl5pPr lvl="4" algn="l">
@@ -3580,7 +3795,10 @@
                 <a:sym typeface="Rubik Light"/>
               </a:defRPr>
             </a:lvl1pPr>
-            <a:lvl2pPr lvl="1">
+            <a:lvl2pPr lvl="1" algn="l">
+              <a:lnSpc>
+                <a:spcPct val="100000"/>
+              </a:lnSpc>
               <a:spcBef>
                 <a:spcPts val="0"/>
               </a:spcBef>
@@ -3591,7 +3809,10 @@
               <a:buNone/>
               <a:defRPr/>
             </a:lvl2pPr>
-            <a:lvl3pPr lvl="2">
+            <a:lvl3pPr lvl="2" algn="l">
+              <a:lnSpc>
+                <a:spcPct val="100000"/>
+              </a:lnSpc>
               <a:spcBef>
                 <a:spcPts val="0"/>
               </a:spcBef>
@@ -3602,7 +3823,10 @@
               <a:buNone/>
               <a:defRPr/>
             </a:lvl3pPr>
-            <a:lvl4pPr lvl="3">
+            <a:lvl4pPr lvl="3" algn="l">
+              <a:lnSpc>
+                <a:spcPct val="100000"/>
+              </a:lnSpc>
               <a:spcBef>
                 <a:spcPts val="0"/>
               </a:spcBef>
@@ -3613,7 +3837,10 @@
               <a:buNone/>
               <a:defRPr/>
             </a:lvl4pPr>
-            <a:lvl5pPr lvl="4">
+            <a:lvl5pPr lvl="4" algn="l">
+              <a:lnSpc>
+                <a:spcPct val="100000"/>
+              </a:lnSpc>
               <a:spcBef>
                 <a:spcPts val="0"/>
               </a:spcBef>
@@ -3624,7 +3851,10 @@
               <a:buNone/>
               <a:defRPr/>
             </a:lvl5pPr>
-            <a:lvl6pPr lvl="5">
+            <a:lvl6pPr lvl="5" algn="l">
+              <a:lnSpc>
+                <a:spcPct val="100000"/>
+              </a:lnSpc>
               <a:spcBef>
                 <a:spcPts val="0"/>
               </a:spcBef>
@@ -3635,7 +3865,10 @@
               <a:buNone/>
               <a:defRPr/>
             </a:lvl6pPr>
-            <a:lvl7pPr lvl="6">
+            <a:lvl7pPr lvl="6" algn="l">
+              <a:lnSpc>
+                <a:spcPct val="100000"/>
+              </a:lnSpc>
               <a:spcBef>
                 <a:spcPts val="0"/>
               </a:spcBef>
@@ -3646,7 +3879,10 @@
               <a:buNone/>
               <a:defRPr/>
             </a:lvl7pPr>
-            <a:lvl8pPr lvl="7">
+            <a:lvl8pPr lvl="7" algn="l">
+              <a:lnSpc>
+                <a:spcPct val="100000"/>
+              </a:lnSpc>
               <a:spcBef>
                 <a:spcPts val="0"/>
               </a:spcBef>
@@ -3657,7 +3893,10 @@
               <a:buNone/>
               <a:defRPr/>
             </a:lvl8pPr>
-            <a:lvl9pPr lvl="8">
+            <a:lvl9pPr lvl="8" algn="l">
+              <a:lnSpc>
+                <a:spcPct val="100000"/>
+              </a:lnSpc>
               <a:spcBef>
                 <a:spcPts val="0"/>
               </a:spcBef>
@@ -3690,7 +3929,7 @@
           <a:ln cap="flat" cmpd="sng" w="9525">
             <a:solidFill>
               <a:schemeClr val="lt1">
-                <a:alpha val="50980"/>
+                <a:alpha val="50588"/>
               </a:schemeClr>
             </a:solidFill>
             <a:prstDash val="solid"/>
@@ -3847,7 +4086,7 @@
                 <a:srgbClr val="2C2C38"/>
               </a:buClr>
               <a:buSzPts val="1800"/>
-              <a:buChar char="▫︎"/>
+              <a:buChar char="▫"/>
               <a:defRPr/>
             </a:lvl4pPr>
             <a:lvl5pPr lvl="4" algn="l">
@@ -3991,7 +4230,10 @@
                 <a:sym typeface="Rubik Light"/>
               </a:defRPr>
             </a:lvl1pPr>
-            <a:lvl2pPr lvl="1">
+            <a:lvl2pPr lvl="1" algn="l">
+              <a:lnSpc>
+                <a:spcPct val="100000"/>
+              </a:lnSpc>
               <a:spcBef>
                 <a:spcPts val="0"/>
               </a:spcBef>
@@ -4002,7 +4244,10 @@
               <a:buNone/>
               <a:defRPr/>
             </a:lvl2pPr>
-            <a:lvl3pPr lvl="2">
+            <a:lvl3pPr lvl="2" algn="l">
+              <a:lnSpc>
+                <a:spcPct val="100000"/>
+              </a:lnSpc>
               <a:spcBef>
                 <a:spcPts val="0"/>
               </a:spcBef>
@@ -4013,7 +4258,10 @@
               <a:buNone/>
               <a:defRPr/>
             </a:lvl3pPr>
-            <a:lvl4pPr lvl="3">
+            <a:lvl4pPr lvl="3" algn="l">
+              <a:lnSpc>
+                <a:spcPct val="100000"/>
+              </a:lnSpc>
               <a:spcBef>
                 <a:spcPts val="0"/>
               </a:spcBef>
@@ -4024,7 +4272,10 @@
               <a:buNone/>
               <a:defRPr/>
             </a:lvl4pPr>
-            <a:lvl5pPr lvl="4">
+            <a:lvl5pPr lvl="4" algn="l">
+              <a:lnSpc>
+                <a:spcPct val="100000"/>
+              </a:lnSpc>
               <a:spcBef>
                 <a:spcPts val="0"/>
               </a:spcBef>
@@ -4035,7 +4286,10 @@
               <a:buNone/>
               <a:defRPr/>
             </a:lvl5pPr>
-            <a:lvl6pPr lvl="5">
+            <a:lvl6pPr lvl="5" algn="l">
+              <a:lnSpc>
+                <a:spcPct val="100000"/>
+              </a:lnSpc>
               <a:spcBef>
                 <a:spcPts val="0"/>
               </a:spcBef>
@@ -4046,7 +4300,10 @@
               <a:buNone/>
               <a:defRPr/>
             </a:lvl6pPr>
-            <a:lvl7pPr lvl="6">
+            <a:lvl7pPr lvl="6" algn="l">
+              <a:lnSpc>
+                <a:spcPct val="100000"/>
+              </a:lnSpc>
               <a:spcBef>
                 <a:spcPts val="0"/>
               </a:spcBef>
@@ -4057,7 +4314,10 @@
               <a:buNone/>
               <a:defRPr/>
             </a:lvl7pPr>
-            <a:lvl8pPr lvl="7">
+            <a:lvl8pPr lvl="7" algn="l">
+              <a:lnSpc>
+                <a:spcPct val="100000"/>
+              </a:lnSpc>
               <a:spcBef>
                 <a:spcPts val="0"/>
               </a:spcBef>
@@ -4068,7 +4328,10 @@
               <a:buNone/>
               <a:defRPr/>
             </a:lvl8pPr>
-            <a:lvl9pPr lvl="8">
+            <a:lvl9pPr lvl="8" algn="l">
+              <a:lnSpc>
+                <a:spcPct val="100000"/>
+              </a:lnSpc>
               <a:spcBef>
                 <a:spcPts val="0"/>
               </a:spcBef>
@@ -4264,7 +4527,10 @@
                 <a:sym typeface="Rubik"/>
               </a:defRPr>
             </a:lvl1pPr>
-            <a:lvl2pPr lvl="1">
+            <a:lvl2pPr lvl="1" algn="l">
+              <a:lnSpc>
+                <a:spcPct val="100000"/>
+              </a:lnSpc>
               <a:spcBef>
                 <a:spcPts val="0"/>
               </a:spcBef>
@@ -4275,7 +4541,10 @@
               <a:buNone/>
               <a:defRPr/>
             </a:lvl2pPr>
-            <a:lvl3pPr lvl="2">
+            <a:lvl3pPr lvl="2" algn="l">
+              <a:lnSpc>
+                <a:spcPct val="100000"/>
+              </a:lnSpc>
               <a:spcBef>
                 <a:spcPts val="0"/>
               </a:spcBef>
@@ -4286,7 +4555,10 @@
               <a:buNone/>
               <a:defRPr/>
             </a:lvl3pPr>
-            <a:lvl4pPr lvl="3">
+            <a:lvl4pPr lvl="3" algn="l">
+              <a:lnSpc>
+                <a:spcPct val="100000"/>
+              </a:lnSpc>
               <a:spcBef>
                 <a:spcPts val="0"/>
               </a:spcBef>
@@ -4297,7 +4569,10 @@
               <a:buNone/>
               <a:defRPr/>
             </a:lvl4pPr>
-            <a:lvl5pPr lvl="4">
+            <a:lvl5pPr lvl="4" algn="l">
+              <a:lnSpc>
+                <a:spcPct val="100000"/>
+              </a:lnSpc>
               <a:spcBef>
                 <a:spcPts val="0"/>
               </a:spcBef>
@@ -4308,7 +4583,10 @@
               <a:buNone/>
               <a:defRPr/>
             </a:lvl5pPr>
-            <a:lvl6pPr lvl="5">
+            <a:lvl6pPr lvl="5" algn="l">
+              <a:lnSpc>
+                <a:spcPct val="100000"/>
+              </a:lnSpc>
               <a:spcBef>
                 <a:spcPts val="0"/>
               </a:spcBef>
@@ -4319,7 +4597,10 @@
               <a:buNone/>
               <a:defRPr/>
             </a:lvl6pPr>
-            <a:lvl7pPr lvl="6">
+            <a:lvl7pPr lvl="6" algn="l">
+              <a:lnSpc>
+                <a:spcPct val="100000"/>
+              </a:lnSpc>
               <a:spcBef>
                 <a:spcPts val="0"/>
               </a:spcBef>
@@ -4330,7 +4611,10 @@
               <a:buNone/>
               <a:defRPr/>
             </a:lvl7pPr>
-            <a:lvl8pPr lvl="7">
+            <a:lvl8pPr lvl="7" algn="l">
+              <a:lnSpc>
+                <a:spcPct val="100000"/>
+              </a:lnSpc>
               <a:spcBef>
                 <a:spcPts val="0"/>
               </a:spcBef>
@@ -4341,7 +4625,10 @@
               <a:buNone/>
               <a:defRPr/>
             </a:lvl8pPr>
-            <a:lvl9pPr lvl="8">
+            <a:lvl9pPr lvl="8" algn="l">
+              <a:lnSpc>
+                <a:spcPct val="100000"/>
+              </a:lnSpc>
               <a:spcBef>
                 <a:spcPts val="0"/>
               </a:spcBef>
@@ -4472,7 +4759,7 @@
                 <a:schemeClr val="dk1"/>
               </a:buClr>
               <a:buSzPts val="1350"/>
-              <a:buChar char="▫︎"/>
+              <a:buChar char="▫"/>
               <a:defRPr>
                 <a:solidFill>
                   <a:schemeClr val="dk1"/>
@@ -4680,7 +4967,10 @@
                 <a:sym typeface="Rubik"/>
               </a:defRPr>
             </a:lvl1pPr>
-            <a:lvl2pPr lvl="1">
+            <a:lvl2pPr lvl="1" algn="l">
+              <a:lnSpc>
+                <a:spcPct val="100000"/>
+              </a:lnSpc>
               <a:spcBef>
                 <a:spcPts val="0"/>
               </a:spcBef>
@@ -4691,7 +4981,10 @@
               <a:buNone/>
               <a:defRPr/>
             </a:lvl2pPr>
-            <a:lvl3pPr lvl="2">
+            <a:lvl3pPr lvl="2" algn="l">
+              <a:lnSpc>
+                <a:spcPct val="100000"/>
+              </a:lnSpc>
               <a:spcBef>
                 <a:spcPts val="0"/>
               </a:spcBef>
@@ -4702,7 +4995,10 @@
               <a:buNone/>
               <a:defRPr/>
             </a:lvl3pPr>
-            <a:lvl4pPr lvl="3">
+            <a:lvl4pPr lvl="3" algn="l">
+              <a:lnSpc>
+                <a:spcPct val="100000"/>
+              </a:lnSpc>
               <a:spcBef>
                 <a:spcPts val="0"/>
               </a:spcBef>
@@ -4713,7 +5009,10 @@
               <a:buNone/>
               <a:defRPr/>
             </a:lvl4pPr>
-            <a:lvl5pPr lvl="4">
+            <a:lvl5pPr lvl="4" algn="l">
+              <a:lnSpc>
+                <a:spcPct val="100000"/>
+              </a:lnSpc>
               <a:spcBef>
                 <a:spcPts val="0"/>
               </a:spcBef>
@@ -4724,7 +5023,10 @@
               <a:buNone/>
               <a:defRPr/>
             </a:lvl5pPr>
-            <a:lvl6pPr lvl="5">
+            <a:lvl6pPr lvl="5" algn="l">
+              <a:lnSpc>
+                <a:spcPct val="100000"/>
+              </a:lnSpc>
               <a:spcBef>
                 <a:spcPts val="0"/>
               </a:spcBef>
@@ -4735,7 +5037,10 @@
               <a:buNone/>
               <a:defRPr/>
             </a:lvl6pPr>
-            <a:lvl7pPr lvl="6">
+            <a:lvl7pPr lvl="6" algn="l">
+              <a:lnSpc>
+                <a:spcPct val="100000"/>
+              </a:lnSpc>
               <a:spcBef>
                 <a:spcPts val="0"/>
               </a:spcBef>
@@ -4746,7 +5051,10 @@
               <a:buNone/>
               <a:defRPr/>
             </a:lvl7pPr>
-            <a:lvl8pPr lvl="7">
+            <a:lvl8pPr lvl="7" algn="l">
+              <a:lnSpc>
+                <a:spcPct val="100000"/>
+              </a:lnSpc>
               <a:spcBef>
                 <a:spcPts val="0"/>
               </a:spcBef>
@@ -4757,7 +5065,10 @@
               <a:buNone/>
               <a:defRPr/>
             </a:lvl8pPr>
-            <a:lvl9pPr lvl="8">
+            <a:lvl9pPr lvl="8" algn="l">
+              <a:lnSpc>
+                <a:spcPct val="100000"/>
+              </a:lnSpc>
               <a:spcBef>
                 <a:spcPts val="0"/>
               </a:spcBef>
@@ -4888,7 +5199,7 @@
                 <a:schemeClr val="dk1"/>
               </a:buClr>
               <a:buSzPts val="1350"/>
-              <a:buChar char="▫︎"/>
+              <a:buChar char="▫"/>
               <a:defRPr>
                 <a:solidFill>
                   <a:schemeClr val="dk1"/>
@@ -5150,7 +5461,10 @@
                 <a:sym typeface="Rubik"/>
               </a:defRPr>
             </a:lvl1pPr>
-            <a:lvl2pPr lvl="1">
+            <a:lvl2pPr lvl="1" algn="l">
+              <a:lnSpc>
+                <a:spcPct val="100000"/>
+              </a:lnSpc>
               <a:spcBef>
                 <a:spcPts val="0"/>
               </a:spcBef>
@@ -5161,7 +5475,10 @@
               <a:buNone/>
               <a:defRPr/>
             </a:lvl2pPr>
-            <a:lvl3pPr lvl="2">
+            <a:lvl3pPr lvl="2" algn="l">
+              <a:lnSpc>
+                <a:spcPct val="100000"/>
+              </a:lnSpc>
               <a:spcBef>
                 <a:spcPts val="0"/>
               </a:spcBef>
@@ -5172,7 +5489,10 @@
               <a:buNone/>
               <a:defRPr/>
             </a:lvl3pPr>
-            <a:lvl4pPr lvl="3">
+            <a:lvl4pPr lvl="3" algn="l">
+              <a:lnSpc>
+                <a:spcPct val="100000"/>
+              </a:lnSpc>
               <a:spcBef>
                 <a:spcPts val="0"/>
               </a:spcBef>
@@ -5183,7 +5503,10 @@
               <a:buNone/>
               <a:defRPr/>
             </a:lvl4pPr>
-            <a:lvl5pPr lvl="4">
+            <a:lvl5pPr lvl="4" algn="l">
+              <a:lnSpc>
+                <a:spcPct val="100000"/>
+              </a:lnSpc>
               <a:spcBef>
                 <a:spcPts val="0"/>
               </a:spcBef>
@@ -5194,7 +5517,10 @@
               <a:buNone/>
               <a:defRPr/>
             </a:lvl5pPr>
-            <a:lvl6pPr lvl="5">
+            <a:lvl6pPr lvl="5" algn="l">
+              <a:lnSpc>
+                <a:spcPct val="100000"/>
+              </a:lnSpc>
               <a:spcBef>
                 <a:spcPts val="0"/>
               </a:spcBef>
@@ -5205,7 +5531,10 @@
               <a:buNone/>
               <a:defRPr/>
             </a:lvl6pPr>
-            <a:lvl7pPr lvl="6">
+            <a:lvl7pPr lvl="6" algn="l">
+              <a:lnSpc>
+                <a:spcPct val="100000"/>
+              </a:lnSpc>
               <a:spcBef>
                 <a:spcPts val="0"/>
               </a:spcBef>
@@ -5216,7 +5545,10 @@
               <a:buNone/>
               <a:defRPr/>
             </a:lvl7pPr>
-            <a:lvl8pPr lvl="7">
+            <a:lvl8pPr lvl="7" algn="l">
+              <a:lnSpc>
+                <a:spcPct val="100000"/>
+              </a:lnSpc>
               <a:spcBef>
                 <a:spcPts val="0"/>
               </a:spcBef>
@@ -5227,7 +5559,10 @@
               <a:buNone/>
               <a:defRPr/>
             </a:lvl8pPr>
-            <a:lvl9pPr lvl="8">
+            <a:lvl9pPr lvl="8" algn="l">
+              <a:lnSpc>
+                <a:spcPct val="100000"/>
+              </a:lnSpc>
               <a:spcBef>
                 <a:spcPts val="0"/>
               </a:spcBef>
@@ -5545,7 +5880,10 @@
                 <a:sym typeface="Calibri"/>
               </a:defRPr>
             </a:lvl1pPr>
-            <a:lvl2pPr lvl="1">
+            <a:lvl2pPr lvl="1" algn="l">
+              <a:lnSpc>
+                <a:spcPct val="100000"/>
+              </a:lnSpc>
               <a:spcBef>
                 <a:spcPts val="0"/>
               </a:spcBef>
@@ -5556,7 +5894,10 @@
               <a:buNone/>
               <a:defRPr/>
             </a:lvl2pPr>
-            <a:lvl3pPr lvl="2">
+            <a:lvl3pPr lvl="2" algn="l">
+              <a:lnSpc>
+                <a:spcPct val="100000"/>
+              </a:lnSpc>
               <a:spcBef>
                 <a:spcPts val="0"/>
               </a:spcBef>
@@ -5567,7 +5908,10 @@
               <a:buNone/>
               <a:defRPr/>
             </a:lvl3pPr>
-            <a:lvl4pPr lvl="3">
+            <a:lvl4pPr lvl="3" algn="l">
+              <a:lnSpc>
+                <a:spcPct val="100000"/>
+              </a:lnSpc>
               <a:spcBef>
                 <a:spcPts val="0"/>
               </a:spcBef>
@@ -5578,7 +5922,10 @@
               <a:buNone/>
               <a:defRPr/>
             </a:lvl4pPr>
-            <a:lvl5pPr lvl="4">
+            <a:lvl5pPr lvl="4" algn="l">
+              <a:lnSpc>
+                <a:spcPct val="100000"/>
+              </a:lnSpc>
               <a:spcBef>
                 <a:spcPts val="0"/>
               </a:spcBef>
@@ -5589,7 +5936,10 @@
               <a:buNone/>
               <a:defRPr/>
             </a:lvl5pPr>
-            <a:lvl6pPr lvl="5">
+            <a:lvl6pPr lvl="5" algn="l">
+              <a:lnSpc>
+                <a:spcPct val="100000"/>
+              </a:lnSpc>
               <a:spcBef>
                 <a:spcPts val="0"/>
               </a:spcBef>
@@ -5600,7 +5950,10 @@
               <a:buNone/>
               <a:defRPr/>
             </a:lvl6pPr>
-            <a:lvl7pPr lvl="6">
+            <a:lvl7pPr lvl="6" algn="l">
+              <a:lnSpc>
+                <a:spcPct val="100000"/>
+              </a:lnSpc>
               <a:spcBef>
                 <a:spcPts val="0"/>
               </a:spcBef>
@@ -5611,7 +5964,10 @@
               <a:buNone/>
               <a:defRPr/>
             </a:lvl7pPr>
-            <a:lvl8pPr lvl="7">
+            <a:lvl8pPr lvl="7" algn="l">
+              <a:lnSpc>
+                <a:spcPct val="100000"/>
+              </a:lnSpc>
               <a:spcBef>
                 <a:spcPts val="0"/>
               </a:spcBef>
@@ -5622,7 +5978,10 @@
               <a:buNone/>
               <a:defRPr/>
             </a:lvl8pPr>
-            <a:lvl9pPr lvl="8">
+            <a:lvl9pPr lvl="8" algn="l">
+              <a:lnSpc>
+                <a:spcPct val="100000"/>
+              </a:lnSpc>
               <a:spcBef>
                 <a:spcPts val="0"/>
               </a:spcBef>
@@ -6027,93 +6386,213 @@
                 <a:sym typeface="Rubik Light"/>
               </a:defRPr>
             </a:lvl1pPr>
-            <a:lvl2pPr lvl="1">
-              <a:spcBef>
-                <a:spcPts val="0"/>
-              </a:spcBef>
-              <a:spcAft>
-                <a:spcPts val="0"/>
-              </a:spcAft>
+            <a:lvl2pPr lvl="1" marR="0" rtl="0" algn="l">
+              <a:lnSpc>
+                <a:spcPct val="100000"/>
+              </a:lnSpc>
+              <a:spcBef>
+                <a:spcPts val="0"/>
+              </a:spcBef>
+              <a:spcAft>
+                <a:spcPts val="0"/>
+              </a:spcAft>
+              <a:buClr>
+                <a:srgbClr val="000000"/>
+              </a:buClr>
               <a:buSzPts val="1400"/>
-              <a:buNone/>
-              <a:defRPr sz="1800"/>
+              <a:buFont typeface="Arial"/>
+              <a:buNone/>
+              <a:defRPr b="0" i="0" sz="1800" u="none" cap="none" strike="noStrike">
+                <a:solidFill>
+                  <a:srgbClr val="000000"/>
+                </a:solidFill>
+                <a:latin typeface="Arial"/>
+                <a:ea typeface="Arial"/>
+                <a:cs typeface="Arial"/>
+                <a:sym typeface="Arial"/>
+              </a:defRPr>
             </a:lvl2pPr>
-            <a:lvl3pPr lvl="2">
-              <a:spcBef>
-                <a:spcPts val="0"/>
-              </a:spcBef>
-              <a:spcAft>
-                <a:spcPts val="0"/>
-              </a:spcAft>
+            <a:lvl3pPr lvl="2" marR="0" rtl="0" algn="l">
+              <a:lnSpc>
+                <a:spcPct val="100000"/>
+              </a:lnSpc>
+              <a:spcBef>
+                <a:spcPts val="0"/>
+              </a:spcBef>
+              <a:spcAft>
+                <a:spcPts val="0"/>
+              </a:spcAft>
+              <a:buClr>
+                <a:srgbClr val="000000"/>
+              </a:buClr>
               <a:buSzPts val="1400"/>
-              <a:buNone/>
-              <a:defRPr sz="1800"/>
+              <a:buFont typeface="Arial"/>
+              <a:buNone/>
+              <a:defRPr b="0" i="0" sz="1800" u="none" cap="none" strike="noStrike">
+                <a:solidFill>
+                  <a:srgbClr val="000000"/>
+                </a:solidFill>
+                <a:latin typeface="Arial"/>
+                <a:ea typeface="Arial"/>
+                <a:cs typeface="Arial"/>
+                <a:sym typeface="Arial"/>
+              </a:defRPr>
             </a:lvl3pPr>
-            <a:lvl4pPr lvl="3">
-              <a:spcBef>
-                <a:spcPts val="0"/>
-              </a:spcBef>
-              <a:spcAft>
-                <a:spcPts val="0"/>
-              </a:spcAft>
+            <a:lvl4pPr lvl="3" marR="0" rtl="0" algn="l">
+              <a:lnSpc>
+                <a:spcPct val="100000"/>
+              </a:lnSpc>
+              <a:spcBef>
+                <a:spcPts val="0"/>
+              </a:spcBef>
+              <a:spcAft>
+                <a:spcPts val="0"/>
+              </a:spcAft>
+              <a:buClr>
+                <a:srgbClr val="000000"/>
+              </a:buClr>
               <a:buSzPts val="1400"/>
-              <a:buNone/>
-              <a:defRPr sz="1800"/>
+              <a:buFont typeface="Arial"/>
+              <a:buNone/>
+              <a:defRPr b="0" i="0" sz="1800" u="none" cap="none" strike="noStrike">
+                <a:solidFill>
+                  <a:srgbClr val="000000"/>
+                </a:solidFill>
+                <a:latin typeface="Arial"/>
+                <a:ea typeface="Arial"/>
+                <a:cs typeface="Arial"/>
+                <a:sym typeface="Arial"/>
+              </a:defRPr>
             </a:lvl4pPr>
-            <a:lvl5pPr lvl="4">
-              <a:spcBef>
-                <a:spcPts val="0"/>
-              </a:spcBef>
-              <a:spcAft>
-                <a:spcPts val="0"/>
-              </a:spcAft>
+            <a:lvl5pPr lvl="4" marR="0" rtl="0" algn="l">
+              <a:lnSpc>
+                <a:spcPct val="100000"/>
+              </a:lnSpc>
+              <a:spcBef>
+                <a:spcPts val="0"/>
+              </a:spcBef>
+              <a:spcAft>
+                <a:spcPts val="0"/>
+              </a:spcAft>
+              <a:buClr>
+                <a:srgbClr val="000000"/>
+              </a:buClr>
               <a:buSzPts val="1400"/>
-              <a:buNone/>
-              <a:defRPr sz="1800"/>
+              <a:buFont typeface="Arial"/>
+              <a:buNone/>
+              <a:defRPr b="0" i="0" sz="1800" u="none" cap="none" strike="noStrike">
+                <a:solidFill>
+                  <a:srgbClr val="000000"/>
+                </a:solidFill>
+                <a:latin typeface="Arial"/>
+                <a:ea typeface="Arial"/>
+                <a:cs typeface="Arial"/>
+                <a:sym typeface="Arial"/>
+              </a:defRPr>
             </a:lvl5pPr>
-            <a:lvl6pPr lvl="5">
-              <a:spcBef>
-                <a:spcPts val="0"/>
-              </a:spcBef>
-              <a:spcAft>
-                <a:spcPts val="0"/>
-              </a:spcAft>
+            <a:lvl6pPr lvl="5" marR="0" rtl="0" algn="l">
+              <a:lnSpc>
+                <a:spcPct val="100000"/>
+              </a:lnSpc>
+              <a:spcBef>
+                <a:spcPts val="0"/>
+              </a:spcBef>
+              <a:spcAft>
+                <a:spcPts val="0"/>
+              </a:spcAft>
+              <a:buClr>
+                <a:srgbClr val="000000"/>
+              </a:buClr>
               <a:buSzPts val="1400"/>
-              <a:buNone/>
-              <a:defRPr sz="1800"/>
+              <a:buFont typeface="Arial"/>
+              <a:buNone/>
+              <a:defRPr b="0" i="0" sz="1800" u="none" cap="none" strike="noStrike">
+                <a:solidFill>
+                  <a:srgbClr val="000000"/>
+                </a:solidFill>
+                <a:latin typeface="Arial"/>
+                <a:ea typeface="Arial"/>
+                <a:cs typeface="Arial"/>
+                <a:sym typeface="Arial"/>
+              </a:defRPr>
             </a:lvl6pPr>
-            <a:lvl7pPr lvl="6">
-              <a:spcBef>
-                <a:spcPts val="0"/>
-              </a:spcBef>
-              <a:spcAft>
-                <a:spcPts val="0"/>
-              </a:spcAft>
+            <a:lvl7pPr lvl="6" marR="0" rtl="0" algn="l">
+              <a:lnSpc>
+                <a:spcPct val="100000"/>
+              </a:lnSpc>
+              <a:spcBef>
+                <a:spcPts val="0"/>
+              </a:spcBef>
+              <a:spcAft>
+                <a:spcPts val="0"/>
+              </a:spcAft>
+              <a:buClr>
+                <a:srgbClr val="000000"/>
+              </a:buClr>
               <a:buSzPts val="1400"/>
-              <a:buNone/>
-              <a:defRPr sz="1800"/>
+              <a:buFont typeface="Arial"/>
+              <a:buNone/>
+              <a:defRPr b="0" i="0" sz="1800" u="none" cap="none" strike="noStrike">
+                <a:solidFill>
+                  <a:srgbClr val="000000"/>
+                </a:solidFill>
+                <a:latin typeface="Arial"/>
+                <a:ea typeface="Arial"/>
+                <a:cs typeface="Arial"/>
+                <a:sym typeface="Arial"/>
+              </a:defRPr>
             </a:lvl7pPr>
-            <a:lvl8pPr lvl="7">
-              <a:spcBef>
-                <a:spcPts val="0"/>
-              </a:spcBef>
-              <a:spcAft>
-                <a:spcPts val="0"/>
-              </a:spcAft>
+            <a:lvl8pPr lvl="7" marR="0" rtl="0" algn="l">
+              <a:lnSpc>
+                <a:spcPct val="100000"/>
+              </a:lnSpc>
+              <a:spcBef>
+                <a:spcPts val="0"/>
+              </a:spcBef>
+              <a:spcAft>
+                <a:spcPts val="0"/>
+              </a:spcAft>
+              <a:buClr>
+                <a:srgbClr val="000000"/>
+              </a:buClr>
               <a:buSzPts val="1400"/>
-              <a:buNone/>
-              <a:defRPr sz="1800"/>
+              <a:buFont typeface="Arial"/>
+              <a:buNone/>
+              <a:defRPr b="0" i="0" sz="1800" u="none" cap="none" strike="noStrike">
+                <a:solidFill>
+                  <a:srgbClr val="000000"/>
+                </a:solidFill>
+                <a:latin typeface="Arial"/>
+                <a:ea typeface="Arial"/>
+                <a:cs typeface="Arial"/>
+                <a:sym typeface="Arial"/>
+              </a:defRPr>
             </a:lvl8pPr>
-            <a:lvl9pPr lvl="8">
-              <a:spcBef>
-                <a:spcPts val="0"/>
-              </a:spcBef>
-              <a:spcAft>
-                <a:spcPts val="0"/>
-              </a:spcAft>
+            <a:lvl9pPr lvl="8" marR="0" rtl="0" algn="l">
+              <a:lnSpc>
+                <a:spcPct val="100000"/>
+              </a:lnSpc>
+              <a:spcBef>
+                <a:spcPts val="0"/>
+              </a:spcBef>
+              <a:spcAft>
+                <a:spcPts val="0"/>
+              </a:spcAft>
+              <a:buClr>
+                <a:srgbClr val="000000"/>
+              </a:buClr>
               <a:buSzPts val="1400"/>
-              <a:buNone/>
-              <a:defRPr sz="1800"/>
+              <a:buFont typeface="Arial"/>
+              <a:buNone/>
+              <a:defRPr b="0" i="0" sz="1800" u="none" cap="none" strike="noStrike">
+                <a:solidFill>
+                  <a:srgbClr val="000000"/>
+                </a:solidFill>
+                <a:latin typeface="Arial"/>
+                <a:ea typeface="Arial"/>
+                <a:cs typeface="Arial"/>
+                <a:sym typeface="Arial"/>
+              </a:defRPr>
             </a:lvl9pPr>
           </a:lstStyle>
           <a:p/>
@@ -6391,74 +6870,8 @@
         </p:nvSpPr>
         <p:spPr>
           <a:xfrm>
-            <a:off x="3439454" y="4889490"/>
-            <a:ext cx="2265092" cy="156974"/>
-          </a:xfrm>
-          <a:prstGeom prst="rect">
-            <a:avLst/>
-          </a:prstGeom>
-          <a:noFill/>
-          <a:ln>
-            <a:noFill/>
-          </a:ln>
-        </p:spPr>
-        <p:txBody>
-          <a:bodyPr anchorCtr="0" anchor="t" bIns="0" lIns="0" spcFirstLastPara="1" rIns="0" wrap="square" tIns="0">
-            <a:noAutofit/>
-          </a:bodyPr>
-          <a:lstStyle/>
-          <a:p>
-            <a:pPr indent="0" lvl="0" marL="0" marR="0" rtl="0" algn="ctr">
-              <a:lnSpc>
-                <a:spcPct val="100000"/>
-              </a:lnSpc>
-              <a:spcBef>
-                <a:spcPts val="0"/>
-              </a:spcBef>
-              <a:spcAft>
-                <a:spcPts val="0"/>
-              </a:spcAft>
-              <a:buClr>
-                <a:schemeClr val="lt1"/>
-              </a:buClr>
-              <a:buSzPts val="675"/>
-              <a:buFont typeface="Rubik"/>
-              <a:buNone/>
-            </a:pPr>
-            <a:r>
-              <a:rPr b="0" i="0" lang="en-US" sz="675" u="none" cap="none" strike="noStrike">
-                <a:solidFill>
-                  <a:schemeClr val="lt1"/>
-                </a:solidFill>
-                <a:latin typeface="Rubik"/>
-                <a:ea typeface="Rubik"/>
-                <a:cs typeface="Rubik"/>
-                <a:sym typeface="Rubik"/>
-              </a:rPr>
-              <a:t>© 2021 InfluxData. All rights reserved. </a:t>
-            </a:r>
-            <a:endParaRPr b="0" i="0" sz="675" u="none" cap="none" strike="noStrike">
-              <a:solidFill>
-                <a:schemeClr val="lt1"/>
-              </a:solidFill>
-              <a:latin typeface="Rubik"/>
-              <a:ea typeface="Rubik"/>
-              <a:cs typeface="Rubik"/>
-              <a:sym typeface="Rubik"/>
-            </a:endParaRPr>
-          </a:p>
-        </p:txBody>
-      </p:sp>
-      <p:sp>
-        <p:nvSpPr>
-          <p:cNvPr id="10" name="Google Shape;10;p10"/>
-          <p:cNvSpPr txBox="1"/>
-          <p:nvPr/>
-        </p:nvSpPr>
-        <p:spPr>
-          <a:xfrm>
-            <a:off x="7823950" y="4889491"/>
-            <a:ext cx="949478" cy="149432"/>
+            <a:off x="8096075" y="4907179"/>
+            <a:ext cx="949500" cy="149400"/>
           </a:xfrm>
           <a:prstGeom prst="rect">
             <a:avLst/>
@@ -6542,6 +6955,72 @@
               <a:ea typeface="Rubik"/>
               <a:cs typeface="Rubik"/>
               <a:sym typeface="Rubik"/>
+            </a:endParaRPr>
+          </a:p>
+        </p:txBody>
+      </p:sp>
+      <p:sp>
+        <p:nvSpPr>
+          <p:cNvPr id="10" name="Google Shape;10;p10"/>
+          <p:cNvSpPr txBox="1"/>
+          <p:nvPr/>
+        </p:nvSpPr>
+        <p:spPr>
+          <a:xfrm>
+            <a:off x="3914936" y="4889489"/>
+            <a:ext cx="1314000" cy="184800"/>
+          </a:xfrm>
+          <a:prstGeom prst="rect">
+            <a:avLst/>
+          </a:prstGeom>
+          <a:noFill/>
+          <a:ln>
+            <a:noFill/>
+          </a:ln>
+        </p:spPr>
+        <p:txBody>
+          <a:bodyPr anchorCtr="0" anchor="t" bIns="0" lIns="0" spcFirstLastPara="1" rIns="0" wrap="square" tIns="0">
+            <a:spAutoFit/>
+          </a:bodyPr>
+          <a:lstStyle/>
+          <a:p>
+            <a:pPr indent="0" lvl="0" marL="0" marR="0" rtl="0" algn="ctr">
+              <a:lnSpc>
+                <a:spcPct val="100000"/>
+              </a:lnSpc>
+              <a:spcBef>
+                <a:spcPts val="0"/>
+              </a:spcBef>
+              <a:spcAft>
+                <a:spcPts val="0"/>
+              </a:spcAft>
+              <a:buClr>
+                <a:srgbClr val="FFFFFF"/>
+              </a:buClr>
+              <a:buSzPts val="600"/>
+              <a:buFont typeface="Rubik"/>
+              <a:buNone/>
+            </a:pPr>
+            <a:r>
+              <a:rPr b="0" i="0" lang="en-US" sz="600" u="none" cap="none" strike="noStrike">
+                <a:solidFill>
+                  <a:srgbClr val="FFFFFF"/>
+                </a:solidFill>
+                <a:latin typeface="Rubik"/>
+                <a:ea typeface="Rubik"/>
+                <a:cs typeface="Rubik"/>
+                <a:sym typeface="Rubik"/>
+              </a:rPr>
+              <a:t>© 2021 InfluxData. All rights reserved. </a:t>
+            </a:r>
+            <a:endParaRPr b="0" i="0" sz="1400" u="none" cap="none" strike="noStrike">
+              <a:solidFill>
+                <a:srgbClr val="000000"/>
+              </a:solidFill>
+              <a:latin typeface="Arial"/>
+              <a:ea typeface="Arial"/>
+              <a:cs typeface="Arial"/>
+              <a:sym typeface="Arial"/>
             </a:endParaRPr>
           </a:p>
         </p:txBody>
@@ -7341,304 +7820,6 @@
         <p:nvSpPr>
           <p:cNvPr id="60" name="Google Shape;60;p1"/>
           <p:cNvSpPr txBox="1"/>
-          <p:nvPr/>
-        </p:nvSpPr>
-        <p:spPr>
-          <a:xfrm>
-            <a:off x="711705" y="3507708"/>
-            <a:ext cx="5297138" cy="1400383"/>
-          </a:xfrm>
-          <a:prstGeom prst="rect">
-            <a:avLst/>
-          </a:prstGeom>
-          <a:noFill/>
-          <a:ln>
-            <a:noFill/>
-          </a:ln>
-        </p:spPr>
-        <p:txBody>
-          <a:bodyPr anchorCtr="0" anchor="t" bIns="0" lIns="0" spcFirstLastPara="1" rIns="0" wrap="square" tIns="0">
-            <a:spAutoFit/>
-          </a:bodyPr>
-          <a:lstStyle/>
-          <a:p>
-            <a:pPr indent="-177800" lvl="0" marL="177800" marR="0" rtl="0" algn="l">
-              <a:lnSpc>
-                <a:spcPct val="100000"/>
-              </a:lnSpc>
-              <a:spcBef>
-                <a:spcPts val="0"/>
-              </a:spcBef>
-              <a:spcAft>
-                <a:spcPts val="0"/>
-              </a:spcAft>
-              <a:buClr>
-                <a:srgbClr val="FFFFFF"/>
-              </a:buClr>
-              <a:buSzPts val="1300"/>
-              <a:buFont typeface="Helvetica Neue Light"/>
-              <a:buNone/>
-            </a:pPr>
-            <a:r>
-              <a:rPr b="1" i="0" lang="en-US" sz="1300" u="none" cap="none" strike="noStrike">
-                <a:solidFill>
-                  <a:srgbClr val="FFFFFF"/>
-                </a:solidFill>
-                <a:latin typeface="Helvetica Neue Light"/>
-                <a:ea typeface="Helvetica Neue Light"/>
-                <a:cs typeface="Helvetica Neue Light"/>
-                <a:sym typeface="Helvetica Neue Light"/>
-              </a:rPr>
-              <a:t>Emanuele Della Valle</a:t>
-            </a:r>
-            <a:endParaRPr b="1" i="0" sz="1300" u="none" cap="none" strike="noStrike">
-              <a:solidFill>
-                <a:srgbClr val="000000"/>
-              </a:solidFill>
-              <a:latin typeface="Calibri"/>
-              <a:ea typeface="Calibri"/>
-              <a:cs typeface="Calibri"/>
-              <a:sym typeface="Calibri"/>
-            </a:endParaRPr>
-          </a:p>
-          <a:p>
-            <a:pPr indent="-177800" lvl="0" marL="177800" marR="0" rtl="0" algn="l">
-              <a:lnSpc>
-                <a:spcPct val="100000"/>
-              </a:lnSpc>
-              <a:spcBef>
-                <a:spcPts val="0"/>
-              </a:spcBef>
-              <a:spcAft>
-                <a:spcPts val="0"/>
-              </a:spcAft>
-              <a:buClr>
-                <a:srgbClr val="FFFFFF"/>
-              </a:buClr>
-              <a:buSzPts val="1300"/>
-              <a:buFont typeface="Helvetica Neue Light"/>
-              <a:buNone/>
-            </a:pPr>
-            <a:r>
-              <a:rPr b="0" i="0" lang="en-US" sz="1300" u="none" cap="none" strike="noStrike">
-                <a:solidFill>
-                  <a:srgbClr val="FFFFFF"/>
-                </a:solidFill>
-                <a:latin typeface="Helvetica Neue Light"/>
-                <a:ea typeface="Helvetica Neue Light"/>
-                <a:cs typeface="Helvetica Neue Light"/>
-                <a:sym typeface="Helvetica Neue Light"/>
-              </a:rPr>
-              <a:t>Prof. @ Politecnico di Milano </a:t>
-            </a:r>
-            <a:endParaRPr b="0" i="0" sz="1300" u="none" cap="none" strike="noStrike">
-              <a:solidFill>
-                <a:srgbClr val="000000"/>
-              </a:solidFill>
-              <a:latin typeface="Calibri"/>
-              <a:ea typeface="Calibri"/>
-              <a:cs typeface="Calibri"/>
-              <a:sym typeface="Calibri"/>
-            </a:endParaRPr>
-          </a:p>
-          <a:p>
-            <a:pPr indent="-177800" lvl="0" marL="177800" marR="0" rtl="0" algn="l">
-              <a:lnSpc>
-                <a:spcPct val="100000"/>
-              </a:lnSpc>
-              <a:spcBef>
-                <a:spcPts val="0"/>
-              </a:spcBef>
-              <a:spcAft>
-                <a:spcPts val="0"/>
-              </a:spcAft>
-              <a:buClr>
-                <a:srgbClr val="FFFFFF"/>
-              </a:buClr>
-              <a:buSzPts val="1300"/>
-              <a:buFont typeface="Helvetica Neue Light"/>
-              <a:buNone/>
-            </a:pPr>
-            <a:r>
-              <a:rPr b="0" i="0" lang="en-US" sz="1300" u="none" cap="none" strike="noStrike">
-                <a:solidFill>
-                  <a:srgbClr val="FFFFFF"/>
-                </a:solidFill>
-                <a:latin typeface="Helvetica Neue Light"/>
-                <a:ea typeface="Helvetica Neue Light"/>
-                <a:cs typeface="Helvetica Neue Light"/>
-                <a:sym typeface="Helvetica Neue Light"/>
-              </a:rPr>
-              <a:t>Founder &amp; Partner @ Quantia Consulting</a:t>
-            </a:r>
-            <a:endParaRPr b="0" i="0" sz="1300" u="none" cap="none" strike="noStrike">
-              <a:solidFill>
-                <a:srgbClr val="000000"/>
-              </a:solidFill>
-              <a:latin typeface="Calibri"/>
-              <a:ea typeface="Calibri"/>
-              <a:cs typeface="Calibri"/>
-              <a:sym typeface="Calibri"/>
-            </a:endParaRPr>
-          </a:p>
-          <a:p>
-            <a:pPr indent="-177800" lvl="0" marL="177800" marR="0" rtl="0" algn="l">
-              <a:lnSpc>
-                <a:spcPct val="100000"/>
-              </a:lnSpc>
-              <a:spcBef>
-                <a:spcPts val="0"/>
-              </a:spcBef>
-              <a:spcAft>
-                <a:spcPts val="0"/>
-              </a:spcAft>
-              <a:buClr>
-                <a:srgbClr val="FFFFFF"/>
-              </a:buClr>
-              <a:buSzPts val="1300"/>
-              <a:buFont typeface="Helvetica Neue Light"/>
-              <a:buNone/>
-            </a:pPr>
-            <a:r>
-              <a:rPr b="1" i="0" lang="en-US" sz="1300" u="none" cap="none" strike="noStrike">
-                <a:solidFill>
-                  <a:srgbClr val="FFFFFF"/>
-                </a:solidFill>
-                <a:latin typeface="Helvetica Neue Light"/>
-                <a:ea typeface="Helvetica Neue Light"/>
-                <a:cs typeface="Helvetica Neue Light"/>
-                <a:sym typeface="Helvetica Neue Light"/>
-              </a:rPr>
-              <a:t>Marco Balduini</a:t>
-            </a:r>
-            <a:endParaRPr b="1" i="0" sz="1300" u="none" cap="none" strike="noStrike">
-              <a:solidFill>
-                <a:srgbClr val="000000"/>
-              </a:solidFill>
-              <a:latin typeface="Calibri"/>
-              <a:ea typeface="Calibri"/>
-              <a:cs typeface="Calibri"/>
-              <a:sym typeface="Calibri"/>
-            </a:endParaRPr>
-          </a:p>
-          <a:p>
-            <a:pPr indent="-177800" lvl="0" marL="177800" marR="0" rtl="0" algn="l">
-              <a:lnSpc>
-                <a:spcPct val="100000"/>
-              </a:lnSpc>
-              <a:spcBef>
-                <a:spcPts val="0"/>
-              </a:spcBef>
-              <a:spcAft>
-                <a:spcPts val="0"/>
-              </a:spcAft>
-              <a:buClr>
-                <a:srgbClr val="FFFFFF"/>
-              </a:buClr>
-              <a:buSzPts val="1300"/>
-              <a:buFont typeface="Helvetica Neue Light"/>
-              <a:buNone/>
-            </a:pPr>
-            <a:r>
-              <a:rPr b="0" i="0" lang="en-US" sz="1300" u="none" cap="none" strike="noStrike">
-                <a:solidFill>
-                  <a:srgbClr val="FFFFFF"/>
-                </a:solidFill>
-                <a:latin typeface="Helvetica Neue Light"/>
-                <a:ea typeface="Helvetica Neue Light"/>
-                <a:cs typeface="Helvetica Neue Light"/>
-                <a:sym typeface="Helvetica Neue Light"/>
-              </a:rPr>
-              <a:t>Founder &amp; CEO @ Quantia Consulting</a:t>
-            </a:r>
-            <a:endParaRPr/>
-          </a:p>
-          <a:p>
-            <a:pPr indent="-177800" lvl="0" marL="177800" marR="0" rtl="0" algn="l">
-              <a:lnSpc>
-                <a:spcPct val="100000"/>
-              </a:lnSpc>
-              <a:spcBef>
-                <a:spcPts val="0"/>
-              </a:spcBef>
-              <a:spcAft>
-                <a:spcPts val="0"/>
-              </a:spcAft>
-              <a:buClr>
-                <a:srgbClr val="FFFFFF"/>
-              </a:buClr>
-              <a:buSzPts val="1300"/>
-              <a:buFont typeface="Helvetica Neue Light"/>
-              <a:buNone/>
-            </a:pPr>
-            <a:r>
-              <a:rPr b="1" i="0" lang="en-US" sz="1300" u="none" cap="none" strike="noStrike">
-                <a:solidFill>
-                  <a:srgbClr val="FFFFFF"/>
-                </a:solidFill>
-                <a:latin typeface="Helvetica Neue Light"/>
-                <a:ea typeface="Helvetica Neue Light"/>
-                <a:cs typeface="Helvetica Neue Light"/>
-                <a:sym typeface="Helvetica Neue Light"/>
-              </a:rPr>
-              <a:t>Riccardo Tommasini</a:t>
-            </a:r>
-            <a:endParaRPr b="1" i="0" sz="1300" u="none" cap="none" strike="noStrike">
-              <a:solidFill>
-                <a:srgbClr val="000000"/>
-              </a:solidFill>
-              <a:latin typeface="Calibri"/>
-              <a:ea typeface="Calibri"/>
-              <a:cs typeface="Calibri"/>
-              <a:sym typeface="Calibri"/>
-            </a:endParaRPr>
-          </a:p>
-          <a:p>
-            <a:pPr indent="-100013" lvl="0" marL="100013" marR="0" rtl="0" algn="l">
-              <a:lnSpc>
-                <a:spcPct val="100000"/>
-              </a:lnSpc>
-              <a:spcBef>
-                <a:spcPts val="0"/>
-              </a:spcBef>
-              <a:spcAft>
-                <a:spcPts val="0"/>
-              </a:spcAft>
-              <a:buClr>
-                <a:srgbClr val="FFFFFF"/>
-              </a:buClr>
-              <a:buSzPts val="1300"/>
-              <a:buFont typeface="Helvetica Neue Light"/>
-              <a:buNone/>
-            </a:pPr>
-            <a:r>
-              <a:rPr b="0" i="0" lang="en-US" sz="1300" u="none" cap="none" strike="noStrike">
-                <a:solidFill>
-                  <a:srgbClr val="FFFFFF"/>
-                </a:solidFill>
-                <a:latin typeface="Helvetica Neue Light"/>
-                <a:ea typeface="Helvetica Neue Light"/>
-                <a:cs typeface="Helvetica Neue Light"/>
-                <a:sym typeface="Helvetica Neue Light"/>
-              </a:rPr>
-              <a:t>Prof. @ University of Tartu</a:t>
-            </a:r>
-            <a:endParaRPr b="0" i="0" sz="1300" u="none" cap="none" strike="noStrike">
-              <a:solidFill>
-                <a:srgbClr val="000000"/>
-              </a:solidFill>
-              <a:latin typeface="Calibri"/>
-              <a:ea typeface="Calibri"/>
-              <a:cs typeface="Calibri"/>
-              <a:sym typeface="Calibri"/>
-            </a:endParaRPr>
-          </a:p>
-        </p:txBody>
-      </p:sp>
-      <p:sp>
-        <p:nvSpPr>
-          <p:cNvPr id="61" name="Google Shape;61;p1"/>
-          <p:cNvSpPr txBox="1"/>
           <p:nvPr>
             <p:ph idx="12" type="sldNum"/>
           </p:nvPr>
@@ -7684,6 +7865,312 @@
               <a:t>‹#›</a:t>
             </a:fld>
             <a:endParaRPr/>
+          </a:p>
+        </p:txBody>
+      </p:sp>
+      <p:sp>
+        <p:nvSpPr>
+          <p:cNvPr id="61" name="Google Shape;61;p1"/>
+          <p:cNvSpPr txBox="1"/>
+          <p:nvPr/>
+        </p:nvSpPr>
+        <p:spPr>
+          <a:xfrm>
+            <a:off x="711705" y="3507707"/>
+            <a:ext cx="5297100" cy="1400700"/>
+          </a:xfrm>
+          <a:prstGeom prst="rect">
+            <a:avLst/>
+          </a:prstGeom>
+          <a:noFill/>
+          <a:ln>
+            <a:noFill/>
+          </a:ln>
+        </p:spPr>
+        <p:txBody>
+          <a:bodyPr anchorCtr="0" anchor="t" bIns="0" lIns="0" spcFirstLastPara="1" rIns="0" wrap="square" tIns="0">
+            <a:spAutoFit/>
+          </a:bodyPr>
+          <a:lstStyle/>
+          <a:p>
+            <a:pPr indent="-177800" lvl="0" marL="177800" marR="0" rtl="0" algn="l">
+              <a:lnSpc>
+                <a:spcPct val="100000"/>
+              </a:lnSpc>
+              <a:spcBef>
+                <a:spcPts val="0"/>
+              </a:spcBef>
+              <a:spcAft>
+                <a:spcPts val="0"/>
+              </a:spcAft>
+              <a:buClr>
+                <a:srgbClr val="FFFFFF"/>
+              </a:buClr>
+              <a:buSzPts val="1300"/>
+              <a:buFont typeface="Helvetica Neue"/>
+              <a:buNone/>
+            </a:pPr>
+            <a:r>
+              <a:rPr b="0" i="0" lang="en-US" sz="1300" u="none" cap="none" strike="noStrike">
+                <a:solidFill>
+                  <a:srgbClr val="FFFFFF"/>
+                </a:solidFill>
+                <a:latin typeface="Helvetica Neue"/>
+                <a:ea typeface="Helvetica Neue"/>
+                <a:cs typeface="Helvetica Neue"/>
+                <a:sym typeface="Helvetica Neue"/>
+              </a:rPr>
+              <a:t>Emanuele Della Valle</a:t>
+            </a:r>
+            <a:endParaRPr b="0" i="0" sz="1400" u="none" cap="none" strike="noStrike">
+              <a:solidFill>
+                <a:srgbClr val="000000"/>
+              </a:solidFill>
+              <a:latin typeface="Calibri"/>
+              <a:ea typeface="Calibri"/>
+              <a:cs typeface="Calibri"/>
+              <a:sym typeface="Calibri"/>
+            </a:endParaRPr>
+          </a:p>
+          <a:p>
+            <a:pPr indent="-177800" lvl="0" marL="177800" marR="0" rtl="0" algn="l">
+              <a:lnSpc>
+                <a:spcPct val="100000"/>
+              </a:lnSpc>
+              <a:spcBef>
+                <a:spcPts val="0"/>
+              </a:spcBef>
+              <a:spcAft>
+                <a:spcPts val="0"/>
+              </a:spcAft>
+              <a:buClr>
+                <a:srgbClr val="FFFFFF"/>
+              </a:buClr>
+              <a:buSzPts val="1300"/>
+              <a:buFont typeface="Helvetica Neue"/>
+              <a:buNone/>
+            </a:pPr>
+            <a:r>
+              <a:rPr b="0" i="0" lang="en-US" sz="1300" u="none" cap="none" strike="noStrike">
+                <a:solidFill>
+                  <a:srgbClr val="FFFFFF"/>
+                </a:solidFill>
+                <a:latin typeface="Helvetica Neue"/>
+                <a:ea typeface="Helvetica Neue"/>
+                <a:cs typeface="Helvetica Neue"/>
+                <a:sym typeface="Helvetica Neue"/>
+              </a:rPr>
+              <a:t>Prof. @ Politecnico di Milano </a:t>
+            </a:r>
+            <a:endParaRPr b="0" i="0" sz="1400" u="none" cap="none" strike="noStrike">
+              <a:solidFill>
+                <a:srgbClr val="000000"/>
+              </a:solidFill>
+              <a:latin typeface="Calibri"/>
+              <a:ea typeface="Calibri"/>
+              <a:cs typeface="Calibri"/>
+              <a:sym typeface="Calibri"/>
+            </a:endParaRPr>
+          </a:p>
+          <a:p>
+            <a:pPr indent="-177800" lvl="0" marL="177800" marR="0" rtl="0" algn="l">
+              <a:lnSpc>
+                <a:spcPct val="100000"/>
+              </a:lnSpc>
+              <a:spcBef>
+                <a:spcPts val="0"/>
+              </a:spcBef>
+              <a:spcAft>
+                <a:spcPts val="0"/>
+              </a:spcAft>
+              <a:buClr>
+                <a:srgbClr val="FFFFFF"/>
+              </a:buClr>
+              <a:buSzPts val="1300"/>
+              <a:buFont typeface="Helvetica Neue"/>
+              <a:buNone/>
+            </a:pPr>
+            <a:r>
+              <a:rPr b="0" i="0" lang="en-US" sz="1300" u="none" cap="none" strike="noStrike">
+                <a:solidFill>
+                  <a:srgbClr val="FFFFFF"/>
+                </a:solidFill>
+                <a:latin typeface="Helvetica Neue"/>
+                <a:ea typeface="Helvetica Neue"/>
+                <a:cs typeface="Helvetica Neue"/>
+                <a:sym typeface="Helvetica Neue"/>
+              </a:rPr>
+              <a:t>Founder &amp; Partner @ Quantia Consulting</a:t>
+            </a:r>
+            <a:endParaRPr b="0" i="0" sz="1400" u="none" cap="none" strike="noStrike">
+              <a:solidFill>
+                <a:srgbClr val="000000"/>
+              </a:solidFill>
+              <a:latin typeface="Calibri"/>
+              <a:ea typeface="Calibri"/>
+              <a:cs typeface="Calibri"/>
+              <a:sym typeface="Calibri"/>
+            </a:endParaRPr>
+          </a:p>
+          <a:p>
+            <a:pPr indent="-177800" lvl="0" marL="177800" marR="0" rtl="0" algn="l">
+              <a:lnSpc>
+                <a:spcPct val="100000"/>
+              </a:lnSpc>
+              <a:spcBef>
+                <a:spcPts val="0"/>
+              </a:spcBef>
+              <a:spcAft>
+                <a:spcPts val="0"/>
+              </a:spcAft>
+              <a:buClr>
+                <a:srgbClr val="FFFFFF"/>
+              </a:buClr>
+              <a:buSzPts val="1300"/>
+              <a:buFont typeface="Helvetica Neue"/>
+              <a:buNone/>
+            </a:pPr>
+            <a:r>
+              <a:rPr b="0" i="0" lang="en-US" sz="1300" u="none" cap="none" strike="noStrike">
+                <a:solidFill>
+                  <a:srgbClr val="FFFFFF"/>
+                </a:solidFill>
+                <a:latin typeface="Helvetica Neue"/>
+                <a:ea typeface="Helvetica Neue"/>
+                <a:cs typeface="Helvetica Neue"/>
+                <a:sym typeface="Helvetica Neue"/>
+              </a:rPr>
+              <a:t>Marco Balduini</a:t>
+            </a:r>
+            <a:endParaRPr b="0" i="0" sz="1400" u="none" cap="none" strike="noStrike">
+              <a:solidFill>
+                <a:srgbClr val="000000"/>
+              </a:solidFill>
+              <a:latin typeface="Calibri"/>
+              <a:ea typeface="Calibri"/>
+              <a:cs typeface="Calibri"/>
+              <a:sym typeface="Calibri"/>
+            </a:endParaRPr>
+          </a:p>
+          <a:p>
+            <a:pPr indent="-177800" lvl="0" marL="177800" marR="0" rtl="0" algn="l">
+              <a:lnSpc>
+                <a:spcPct val="100000"/>
+              </a:lnSpc>
+              <a:spcBef>
+                <a:spcPts val="0"/>
+              </a:spcBef>
+              <a:spcAft>
+                <a:spcPts val="0"/>
+              </a:spcAft>
+              <a:buClr>
+                <a:srgbClr val="FFFFFF"/>
+              </a:buClr>
+              <a:buSzPts val="1300"/>
+              <a:buFont typeface="Helvetica Neue"/>
+              <a:buNone/>
+            </a:pPr>
+            <a:r>
+              <a:rPr b="0" i="0" lang="en-US" sz="1300" u="none" cap="none" strike="noStrike">
+                <a:solidFill>
+                  <a:srgbClr val="FFFFFF"/>
+                </a:solidFill>
+                <a:latin typeface="Helvetica Neue"/>
+                <a:ea typeface="Helvetica Neue"/>
+                <a:cs typeface="Helvetica Neue"/>
+                <a:sym typeface="Helvetica Neue"/>
+              </a:rPr>
+              <a:t>Founder &amp; CEO @ Quantia Consulting</a:t>
+            </a:r>
+            <a:endParaRPr b="0" i="0" sz="1800" u="none" cap="none" strike="noStrike">
+              <a:solidFill>
+                <a:srgbClr val="000000"/>
+              </a:solidFill>
+              <a:latin typeface="Calibri"/>
+              <a:ea typeface="Calibri"/>
+              <a:cs typeface="Calibri"/>
+              <a:sym typeface="Calibri"/>
+            </a:endParaRPr>
+          </a:p>
+          <a:p>
+            <a:pPr indent="-177800" lvl="0" marL="177800" marR="0" rtl="0" algn="l">
+              <a:lnSpc>
+                <a:spcPct val="100000"/>
+              </a:lnSpc>
+              <a:spcBef>
+                <a:spcPts val="0"/>
+              </a:spcBef>
+              <a:spcAft>
+                <a:spcPts val="0"/>
+              </a:spcAft>
+              <a:buClr>
+                <a:srgbClr val="FFFFFF"/>
+              </a:buClr>
+              <a:buSzPts val="1300"/>
+              <a:buFont typeface="Helvetica Neue"/>
+              <a:buNone/>
+            </a:pPr>
+            <a:r>
+              <a:rPr b="0" i="0" lang="en-US" sz="1300" u="none" cap="none" strike="noStrike">
+                <a:solidFill>
+                  <a:srgbClr val="FFFFFF"/>
+                </a:solidFill>
+                <a:latin typeface="Helvetica Neue"/>
+                <a:ea typeface="Helvetica Neue"/>
+                <a:cs typeface="Helvetica Neue"/>
+                <a:sym typeface="Helvetica Neue"/>
+              </a:rPr>
+              <a:t>Riccardo Tommasini</a:t>
+            </a:r>
+            <a:endParaRPr b="0" i="0" sz="1400" u="none" cap="none" strike="noStrike">
+              <a:solidFill>
+                <a:srgbClr val="000000"/>
+              </a:solidFill>
+              <a:latin typeface="Calibri"/>
+              <a:ea typeface="Calibri"/>
+              <a:cs typeface="Calibri"/>
+              <a:sym typeface="Calibri"/>
+            </a:endParaRPr>
+          </a:p>
+          <a:p>
+            <a:pPr indent="-100012" lvl="0" marL="100012" marR="0" rtl="0" algn="l">
+              <a:lnSpc>
+                <a:spcPct val="100000"/>
+              </a:lnSpc>
+              <a:spcBef>
+                <a:spcPts val="0"/>
+              </a:spcBef>
+              <a:spcAft>
+                <a:spcPts val="0"/>
+              </a:spcAft>
+              <a:buClr>
+                <a:srgbClr val="FFFFFF"/>
+              </a:buClr>
+              <a:buSzPts val="1300"/>
+              <a:buFont typeface="Helvetica Neue"/>
+              <a:buNone/>
+            </a:pPr>
+            <a:r>
+              <a:rPr b="0" i="0" lang="en-US" sz="1300" u="none" cap="none" strike="noStrike">
+                <a:solidFill>
+                  <a:srgbClr val="FFFFFF"/>
+                </a:solidFill>
+                <a:latin typeface="Helvetica Neue"/>
+                <a:ea typeface="Helvetica Neue"/>
+                <a:cs typeface="Helvetica Neue"/>
+                <a:sym typeface="Helvetica Neue"/>
+              </a:rPr>
+              <a:t>Prof. @ University of Tartu</a:t>
+            </a:r>
+            <a:endParaRPr b="0" i="0" sz="1400" u="none" cap="none" strike="noStrike">
+              <a:solidFill>
+                <a:srgbClr val="000000"/>
+              </a:solidFill>
+              <a:latin typeface="Arial"/>
+              <a:ea typeface="Arial"/>
+              <a:cs typeface="Arial"/>
+              <a:sym typeface="Arial"/>
+            </a:endParaRPr>
           </a:p>
         </p:txBody>
       </p:sp>
@@ -7940,7 +8427,7 @@
           <a:blip r:embed="rId3">
             <a:alphaModFix/>
           </a:blip>
-          <a:srcRect b="0" l="20414" r="8327" t="0"/>
+          <a:srcRect b="0" l="20414" r="8326" t="0"/>
           <a:stretch/>
         </p:blipFill>
         <p:spPr>
@@ -8562,7 +9049,15 @@
                 </a:rPr>
                 <a:t>BC2</a:t>
               </a:r>
-              <a:endParaRPr/>
+              <a:endParaRPr b="0" i="0" sz="1400" u="none" cap="none" strike="noStrike">
+                <a:solidFill>
+                  <a:srgbClr val="000000"/>
+                </a:solidFill>
+                <a:latin typeface="Arial"/>
+                <a:ea typeface="Arial"/>
+                <a:cs typeface="Arial"/>
+                <a:sym typeface="Arial"/>
+              </a:endParaRPr>
             </a:p>
           </p:txBody>
         </p:sp>
@@ -8885,7 +9380,7 @@
           </a:prstGeom>
           <a:solidFill>
             <a:srgbClr val="44546A">
-              <a:alpha val="73725"/>
+              <a:alpha val="73333"/>
             </a:srgbClr>
           </a:solidFill>
           <a:ln>
@@ -8946,7 +9441,7 @@
           </a:prstGeom>
           <a:solidFill>
             <a:srgbClr val="44546A">
-              <a:alpha val="73725"/>
+              <a:alpha val="73333"/>
             </a:srgbClr>
           </a:solidFill>
           <a:ln>
@@ -9007,7 +9502,7 @@
           </a:prstGeom>
           <a:solidFill>
             <a:srgbClr val="44546A">
-              <a:alpha val="73725"/>
+              <a:alpha val="73333"/>
             </a:srgbClr>
           </a:solidFill>
           <a:ln>
@@ -9444,7 +9939,15 @@
               </a:rPr>
               <a:t>Requirements</a:t>
             </a:r>
-            <a:endParaRPr/>
+            <a:endParaRPr b="0" i="0" sz="1400" u="none" cap="none" strike="noStrike">
+              <a:solidFill>
+                <a:srgbClr val="000000"/>
+              </a:solidFill>
+              <a:latin typeface="Arial"/>
+              <a:ea typeface="Arial"/>
+              <a:cs typeface="Arial"/>
+              <a:sym typeface="Arial"/>
+            </a:endParaRPr>
           </a:p>
         </p:txBody>
       </p:sp>
@@ -9502,7 +10005,15 @@
               </a:rPr>
               <a:t>Test cases</a:t>
             </a:r>
-            <a:endParaRPr/>
+            <a:endParaRPr b="0" i="0" sz="1400" u="none" cap="none" strike="noStrike">
+              <a:solidFill>
+                <a:srgbClr val="000000"/>
+              </a:solidFill>
+              <a:latin typeface="Arial"/>
+              <a:ea typeface="Arial"/>
+              <a:cs typeface="Arial"/>
+              <a:sym typeface="Arial"/>
+            </a:endParaRPr>
           </a:p>
         </p:txBody>
       </p:sp>
@@ -9719,13 +10230,12 @@
           <p:cNvPicPr preferRelativeResize="0"/>
           <p:nvPr/>
         </p:nvPicPr>
-        <p:blipFill>
+        <p:blipFill rotWithShape="1">
           <a:blip r:embed="rId4">
             <a:alphaModFix/>
           </a:blip>
-          <a:stretch>
-            <a:fillRect/>
-          </a:stretch>
+          <a:srcRect b="0" l="0" r="0" t="0"/>
+          <a:stretch/>
         </p:blipFill>
         <p:spPr>
           <a:xfrm rot="561634">
@@ -9963,7 +10473,7 @@
           <a:blip r:embed="rId3">
             <a:alphaModFix/>
           </a:blip>
-          <a:srcRect b="13343" l="0" r="0" t="23230"/>
+          <a:srcRect b="13342" l="0" r="0" t="23230"/>
           <a:stretch/>
         </p:blipFill>
         <p:spPr>
@@ -10285,7 +10795,15 @@
               </a:rPr>
               <a:t>https://v2.docs.influxdata.com/v2.0/reference/flux/stdlib/built-in/transformations/pivot/</a:t>
             </a:r>
-            <a:endParaRPr/>
+            <a:endParaRPr b="0" i="0" sz="1400" u="none" cap="none" strike="noStrike">
+              <a:solidFill>
+                <a:srgbClr val="000000"/>
+              </a:solidFill>
+              <a:latin typeface="Arial"/>
+              <a:ea typeface="Arial"/>
+              <a:cs typeface="Arial"/>
+              <a:sym typeface="Arial"/>
+            </a:endParaRPr>
           </a:p>
         </p:txBody>
       </p:sp>
@@ -10386,304 +10904,6 @@
         <p:nvSpPr>
           <p:cNvPr id="138" name="Google Shape;138;p9"/>
           <p:cNvSpPr txBox="1"/>
-          <p:nvPr/>
-        </p:nvSpPr>
-        <p:spPr>
-          <a:xfrm>
-            <a:off x="711705" y="3507708"/>
-            <a:ext cx="5297138" cy="1400383"/>
-          </a:xfrm>
-          <a:prstGeom prst="rect">
-            <a:avLst/>
-          </a:prstGeom>
-          <a:noFill/>
-          <a:ln>
-            <a:noFill/>
-          </a:ln>
-        </p:spPr>
-        <p:txBody>
-          <a:bodyPr anchorCtr="0" anchor="t" bIns="0" lIns="0" spcFirstLastPara="1" rIns="0" wrap="square" tIns="0">
-            <a:spAutoFit/>
-          </a:bodyPr>
-          <a:lstStyle/>
-          <a:p>
-            <a:pPr indent="-177800" lvl="0" marL="177800" marR="0" rtl="0" algn="l">
-              <a:lnSpc>
-                <a:spcPct val="100000"/>
-              </a:lnSpc>
-              <a:spcBef>
-                <a:spcPts val="0"/>
-              </a:spcBef>
-              <a:spcAft>
-                <a:spcPts val="0"/>
-              </a:spcAft>
-              <a:buClr>
-                <a:srgbClr val="FFFFFF"/>
-              </a:buClr>
-              <a:buSzPts val="1300"/>
-              <a:buFont typeface="Helvetica Neue Light"/>
-              <a:buNone/>
-            </a:pPr>
-            <a:r>
-              <a:rPr b="1" i="0" lang="en-US" sz="1300" u="none" cap="none" strike="noStrike">
-                <a:solidFill>
-                  <a:srgbClr val="FFFFFF"/>
-                </a:solidFill>
-                <a:latin typeface="Helvetica Neue Light"/>
-                <a:ea typeface="Helvetica Neue Light"/>
-                <a:cs typeface="Helvetica Neue Light"/>
-                <a:sym typeface="Helvetica Neue Light"/>
-              </a:rPr>
-              <a:t>Emanuele Della Valle</a:t>
-            </a:r>
-            <a:endParaRPr b="1" i="0" sz="1300" u="none" cap="none" strike="noStrike">
-              <a:solidFill>
-                <a:srgbClr val="000000"/>
-              </a:solidFill>
-              <a:latin typeface="Calibri"/>
-              <a:ea typeface="Calibri"/>
-              <a:cs typeface="Calibri"/>
-              <a:sym typeface="Calibri"/>
-            </a:endParaRPr>
-          </a:p>
-          <a:p>
-            <a:pPr indent="-177800" lvl="0" marL="177800" marR="0" rtl="0" algn="l">
-              <a:lnSpc>
-                <a:spcPct val="100000"/>
-              </a:lnSpc>
-              <a:spcBef>
-                <a:spcPts val="0"/>
-              </a:spcBef>
-              <a:spcAft>
-                <a:spcPts val="0"/>
-              </a:spcAft>
-              <a:buClr>
-                <a:srgbClr val="FFFFFF"/>
-              </a:buClr>
-              <a:buSzPts val="1300"/>
-              <a:buFont typeface="Helvetica Neue Light"/>
-              <a:buNone/>
-            </a:pPr>
-            <a:r>
-              <a:rPr b="0" i="0" lang="en-US" sz="1300" u="none" cap="none" strike="noStrike">
-                <a:solidFill>
-                  <a:srgbClr val="FFFFFF"/>
-                </a:solidFill>
-                <a:latin typeface="Helvetica Neue Light"/>
-                <a:ea typeface="Helvetica Neue Light"/>
-                <a:cs typeface="Helvetica Neue Light"/>
-                <a:sym typeface="Helvetica Neue Light"/>
-              </a:rPr>
-              <a:t>Prof. @ Politecnico di Milano </a:t>
-            </a:r>
-            <a:endParaRPr b="0" i="0" sz="1300" u="none" cap="none" strike="noStrike">
-              <a:solidFill>
-                <a:srgbClr val="000000"/>
-              </a:solidFill>
-              <a:latin typeface="Calibri"/>
-              <a:ea typeface="Calibri"/>
-              <a:cs typeface="Calibri"/>
-              <a:sym typeface="Calibri"/>
-            </a:endParaRPr>
-          </a:p>
-          <a:p>
-            <a:pPr indent="-177800" lvl="0" marL="177800" marR="0" rtl="0" algn="l">
-              <a:lnSpc>
-                <a:spcPct val="100000"/>
-              </a:lnSpc>
-              <a:spcBef>
-                <a:spcPts val="0"/>
-              </a:spcBef>
-              <a:spcAft>
-                <a:spcPts val="0"/>
-              </a:spcAft>
-              <a:buClr>
-                <a:srgbClr val="FFFFFF"/>
-              </a:buClr>
-              <a:buSzPts val="1300"/>
-              <a:buFont typeface="Helvetica Neue Light"/>
-              <a:buNone/>
-            </a:pPr>
-            <a:r>
-              <a:rPr b="0" i="0" lang="en-US" sz="1300" u="none" cap="none" strike="noStrike">
-                <a:solidFill>
-                  <a:srgbClr val="FFFFFF"/>
-                </a:solidFill>
-                <a:latin typeface="Helvetica Neue Light"/>
-                <a:ea typeface="Helvetica Neue Light"/>
-                <a:cs typeface="Helvetica Neue Light"/>
-                <a:sym typeface="Helvetica Neue Light"/>
-              </a:rPr>
-              <a:t>Founder &amp; Partner @ Quantia Consulting</a:t>
-            </a:r>
-            <a:endParaRPr b="0" i="0" sz="1300" u="none" cap="none" strike="noStrike">
-              <a:solidFill>
-                <a:srgbClr val="000000"/>
-              </a:solidFill>
-              <a:latin typeface="Calibri"/>
-              <a:ea typeface="Calibri"/>
-              <a:cs typeface="Calibri"/>
-              <a:sym typeface="Calibri"/>
-            </a:endParaRPr>
-          </a:p>
-          <a:p>
-            <a:pPr indent="-177800" lvl="0" marL="177800" marR="0" rtl="0" algn="l">
-              <a:lnSpc>
-                <a:spcPct val="100000"/>
-              </a:lnSpc>
-              <a:spcBef>
-                <a:spcPts val="0"/>
-              </a:spcBef>
-              <a:spcAft>
-                <a:spcPts val="0"/>
-              </a:spcAft>
-              <a:buClr>
-                <a:srgbClr val="FFFFFF"/>
-              </a:buClr>
-              <a:buSzPts val="1300"/>
-              <a:buFont typeface="Helvetica Neue Light"/>
-              <a:buNone/>
-            </a:pPr>
-            <a:r>
-              <a:rPr b="1" i="0" lang="en-US" sz="1300" u="none" cap="none" strike="noStrike">
-                <a:solidFill>
-                  <a:srgbClr val="FFFFFF"/>
-                </a:solidFill>
-                <a:latin typeface="Helvetica Neue Light"/>
-                <a:ea typeface="Helvetica Neue Light"/>
-                <a:cs typeface="Helvetica Neue Light"/>
-                <a:sym typeface="Helvetica Neue Light"/>
-              </a:rPr>
-              <a:t>Marco Balduini</a:t>
-            </a:r>
-            <a:endParaRPr b="1" i="0" sz="1300" u="none" cap="none" strike="noStrike">
-              <a:solidFill>
-                <a:srgbClr val="000000"/>
-              </a:solidFill>
-              <a:latin typeface="Calibri"/>
-              <a:ea typeface="Calibri"/>
-              <a:cs typeface="Calibri"/>
-              <a:sym typeface="Calibri"/>
-            </a:endParaRPr>
-          </a:p>
-          <a:p>
-            <a:pPr indent="-177800" lvl="0" marL="177800" marR="0" rtl="0" algn="l">
-              <a:lnSpc>
-                <a:spcPct val="100000"/>
-              </a:lnSpc>
-              <a:spcBef>
-                <a:spcPts val="0"/>
-              </a:spcBef>
-              <a:spcAft>
-                <a:spcPts val="0"/>
-              </a:spcAft>
-              <a:buClr>
-                <a:srgbClr val="FFFFFF"/>
-              </a:buClr>
-              <a:buSzPts val="1300"/>
-              <a:buFont typeface="Helvetica Neue Light"/>
-              <a:buNone/>
-            </a:pPr>
-            <a:r>
-              <a:rPr b="0" i="0" lang="en-US" sz="1300" u="none" cap="none" strike="noStrike">
-                <a:solidFill>
-                  <a:srgbClr val="FFFFFF"/>
-                </a:solidFill>
-                <a:latin typeface="Helvetica Neue Light"/>
-                <a:ea typeface="Helvetica Neue Light"/>
-                <a:cs typeface="Helvetica Neue Light"/>
-                <a:sym typeface="Helvetica Neue Light"/>
-              </a:rPr>
-              <a:t>Founder &amp; CEO @ Quantia Consulting</a:t>
-            </a:r>
-            <a:endParaRPr/>
-          </a:p>
-          <a:p>
-            <a:pPr indent="-177800" lvl="0" marL="177800" marR="0" rtl="0" algn="l">
-              <a:lnSpc>
-                <a:spcPct val="100000"/>
-              </a:lnSpc>
-              <a:spcBef>
-                <a:spcPts val="0"/>
-              </a:spcBef>
-              <a:spcAft>
-                <a:spcPts val="0"/>
-              </a:spcAft>
-              <a:buClr>
-                <a:srgbClr val="FFFFFF"/>
-              </a:buClr>
-              <a:buSzPts val="1300"/>
-              <a:buFont typeface="Helvetica Neue Light"/>
-              <a:buNone/>
-            </a:pPr>
-            <a:r>
-              <a:rPr b="1" i="0" lang="en-US" sz="1300" u="none" cap="none" strike="noStrike">
-                <a:solidFill>
-                  <a:srgbClr val="FFFFFF"/>
-                </a:solidFill>
-                <a:latin typeface="Helvetica Neue Light"/>
-                <a:ea typeface="Helvetica Neue Light"/>
-                <a:cs typeface="Helvetica Neue Light"/>
-                <a:sym typeface="Helvetica Neue Light"/>
-              </a:rPr>
-              <a:t>Riccardo Tommasini</a:t>
-            </a:r>
-            <a:endParaRPr b="1" i="0" sz="1300" u="none" cap="none" strike="noStrike">
-              <a:solidFill>
-                <a:srgbClr val="000000"/>
-              </a:solidFill>
-              <a:latin typeface="Calibri"/>
-              <a:ea typeface="Calibri"/>
-              <a:cs typeface="Calibri"/>
-              <a:sym typeface="Calibri"/>
-            </a:endParaRPr>
-          </a:p>
-          <a:p>
-            <a:pPr indent="-100013" lvl="0" marL="100013" marR="0" rtl="0" algn="l">
-              <a:lnSpc>
-                <a:spcPct val="100000"/>
-              </a:lnSpc>
-              <a:spcBef>
-                <a:spcPts val="0"/>
-              </a:spcBef>
-              <a:spcAft>
-                <a:spcPts val="0"/>
-              </a:spcAft>
-              <a:buClr>
-                <a:srgbClr val="FFFFFF"/>
-              </a:buClr>
-              <a:buSzPts val="1300"/>
-              <a:buFont typeface="Helvetica Neue Light"/>
-              <a:buNone/>
-            </a:pPr>
-            <a:r>
-              <a:rPr b="0" i="0" lang="en-US" sz="1300" u="none" cap="none" strike="noStrike">
-                <a:solidFill>
-                  <a:srgbClr val="FFFFFF"/>
-                </a:solidFill>
-                <a:latin typeface="Helvetica Neue Light"/>
-                <a:ea typeface="Helvetica Neue Light"/>
-                <a:cs typeface="Helvetica Neue Light"/>
-                <a:sym typeface="Helvetica Neue Light"/>
-              </a:rPr>
-              <a:t>Prof. @ University of Tartu</a:t>
-            </a:r>
-            <a:endParaRPr b="0" i="0" sz="1300" u="none" cap="none" strike="noStrike">
-              <a:solidFill>
-                <a:srgbClr val="000000"/>
-              </a:solidFill>
-              <a:latin typeface="Calibri"/>
-              <a:ea typeface="Calibri"/>
-              <a:cs typeface="Calibri"/>
-              <a:sym typeface="Calibri"/>
-            </a:endParaRPr>
-          </a:p>
-        </p:txBody>
-      </p:sp>
-      <p:sp>
-        <p:nvSpPr>
-          <p:cNvPr id="139" name="Google Shape;139;p9"/>
-          <p:cNvSpPr txBox="1"/>
           <p:nvPr>
             <p:ph idx="12" type="sldNum"/>
           </p:nvPr>
@@ -10729,6 +10949,312 @@
               <a:t>‹#›</a:t>
             </a:fld>
             <a:endParaRPr/>
+          </a:p>
+        </p:txBody>
+      </p:sp>
+      <p:sp>
+        <p:nvSpPr>
+          <p:cNvPr id="139" name="Google Shape;139;p9"/>
+          <p:cNvSpPr txBox="1"/>
+          <p:nvPr/>
+        </p:nvSpPr>
+        <p:spPr>
+          <a:xfrm>
+            <a:off x="711705" y="3507707"/>
+            <a:ext cx="5297100" cy="1400700"/>
+          </a:xfrm>
+          <a:prstGeom prst="rect">
+            <a:avLst/>
+          </a:prstGeom>
+          <a:noFill/>
+          <a:ln>
+            <a:noFill/>
+          </a:ln>
+        </p:spPr>
+        <p:txBody>
+          <a:bodyPr anchorCtr="0" anchor="t" bIns="0" lIns="0" spcFirstLastPara="1" rIns="0" wrap="square" tIns="0">
+            <a:spAutoFit/>
+          </a:bodyPr>
+          <a:lstStyle/>
+          <a:p>
+            <a:pPr indent="-177800" lvl="0" marL="177800" marR="0" rtl="0" algn="l">
+              <a:lnSpc>
+                <a:spcPct val="100000"/>
+              </a:lnSpc>
+              <a:spcBef>
+                <a:spcPts val="0"/>
+              </a:spcBef>
+              <a:spcAft>
+                <a:spcPts val="0"/>
+              </a:spcAft>
+              <a:buClr>
+                <a:srgbClr val="FFFFFF"/>
+              </a:buClr>
+              <a:buSzPts val="1300"/>
+              <a:buFont typeface="Helvetica Neue"/>
+              <a:buNone/>
+            </a:pPr>
+            <a:r>
+              <a:rPr b="0" i="0" lang="en-US" sz="1300" u="none" cap="none" strike="noStrike">
+                <a:solidFill>
+                  <a:srgbClr val="FFFFFF"/>
+                </a:solidFill>
+                <a:latin typeface="Helvetica Neue"/>
+                <a:ea typeface="Helvetica Neue"/>
+                <a:cs typeface="Helvetica Neue"/>
+                <a:sym typeface="Helvetica Neue"/>
+              </a:rPr>
+              <a:t>Emanuele Della Valle</a:t>
+            </a:r>
+            <a:endParaRPr b="0" i="0" sz="1400" u="none" cap="none" strike="noStrike">
+              <a:solidFill>
+                <a:srgbClr val="000000"/>
+              </a:solidFill>
+              <a:latin typeface="Calibri"/>
+              <a:ea typeface="Calibri"/>
+              <a:cs typeface="Calibri"/>
+              <a:sym typeface="Calibri"/>
+            </a:endParaRPr>
+          </a:p>
+          <a:p>
+            <a:pPr indent="-177800" lvl="0" marL="177800" marR="0" rtl="0" algn="l">
+              <a:lnSpc>
+                <a:spcPct val="100000"/>
+              </a:lnSpc>
+              <a:spcBef>
+                <a:spcPts val="0"/>
+              </a:spcBef>
+              <a:spcAft>
+                <a:spcPts val="0"/>
+              </a:spcAft>
+              <a:buClr>
+                <a:srgbClr val="FFFFFF"/>
+              </a:buClr>
+              <a:buSzPts val="1300"/>
+              <a:buFont typeface="Helvetica Neue"/>
+              <a:buNone/>
+            </a:pPr>
+            <a:r>
+              <a:rPr b="0" i="0" lang="en-US" sz="1300" u="none" cap="none" strike="noStrike">
+                <a:solidFill>
+                  <a:srgbClr val="FFFFFF"/>
+                </a:solidFill>
+                <a:latin typeface="Helvetica Neue"/>
+                <a:ea typeface="Helvetica Neue"/>
+                <a:cs typeface="Helvetica Neue"/>
+                <a:sym typeface="Helvetica Neue"/>
+              </a:rPr>
+              <a:t>Prof. @ Politecnico di Milano </a:t>
+            </a:r>
+            <a:endParaRPr b="0" i="0" sz="1400" u="none" cap="none" strike="noStrike">
+              <a:solidFill>
+                <a:srgbClr val="000000"/>
+              </a:solidFill>
+              <a:latin typeface="Calibri"/>
+              <a:ea typeface="Calibri"/>
+              <a:cs typeface="Calibri"/>
+              <a:sym typeface="Calibri"/>
+            </a:endParaRPr>
+          </a:p>
+          <a:p>
+            <a:pPr indent="-177800" lvl="0" marL="177800" marR="0" rtl="0" algn="l">
+              <a:lnSpc>
+                <a:spcPct val="100000"/>
+              </a:lnSpc>
+              <a:spcBef>
+                <a:spcPts val="0"/>
+              </a:spcBef>
+              <a:spcAft>
+                <a:spcPts val="0"/>
+              </a:spcAft>
+              <a:buClr>
+                <a:srgbClr val="FFFFFF"/>
+              </a:buClr>
+              <a:buSzPts val="1300"/>
+              <a:buFont typeface="Helvetica Neue"/>
+              <a:buNone/>
+            </a:pPr>
+            <a:r>
+              <a:rPr b="0" i="0" lang="en-US" sz="1300" u="none" cap="none" strike="noStrike">
+                <a:solidFill>
+                  <a:srgbClr val="FFFFFF"/>
+                </a:solidFill>
+                <a:latin typeface="Helvetica Neue"/>
+                <a:ea typeface="Helvetica Neue"/>
+                <a:cs typeface="Helvetica Neue"/>
+                <a:sym typeface="Helvetica Neue"/>
+              </a:rPr>
+              <a:t>Founder &amp; Partner @ Quantia Consulting</a:t>
+            </a:r>
+            <a:endParaRPr b="0" i="0" sz="1400" u="none" cap="none" strike="noStrike">
+              <a:solidFill>
+                <a:srgbClr val="000000"/>
+              </a:solidFill>
+              <a:latin typeface="Calibri"/>
+              <a:ea typeface="Calibri"/>
+              <a:cs typeface="Calibri"/>
+              <a:sym typeface="Calibri"/>
+            </a:endParaRPr>
+          </a:p>
+          <a:p>
+            <a:pPr indent="-177800" lvl="0" marL="177800" marR="0" rtl="0" algn="l">
+              <a:lnSpc>
+                <a:spcPct val="100000"/>
+              </a:lnSpc>
+              <a:spcBef>
+                <a:spcPts val="0"/>
+              </a:spcBef>
+              <a:spcAft>
+                <a:spcPts val="0"/>
+              </a:spcAft>
+              <a:buClr>
+                <a:srgbClr val="FFFFFF"/>
+              </a:buClr>
+              <a:buSzPts val="1300"/>
+              <a:buFont typeface="Helvetica Neue"/>
+              <a:buNone/>
+            </a:pPr>
+            <a:r>
+              <a:rPr b="0" i="0" lang="en-US" sz="1300" u="none" cap="none" strike="noStrike">
+                <a:solidFill>
+                  <a:srgbClr val="FFFFFF"/>
+                </a:solidFill>
+                <a:latin typeface="Helvetica Neue"/>
+                <a:ea typeface="Helvetica Neue"/>
+                <a:cs typeface="Helvetica Neue"/>
+                <a:sym typeface="Helvetica Neue"/>
+              </a:rPr>
+              <a:t>Marco Balduini</a:t>
+            </a:r>
+            <a:endParaRPr b="0" i="0" sz="1400" u="none" cap="none" strike="noStrike">
+              <a:solidFill>
+                <a:srgbClr val="000000"/>
+              </a:solidFill>
+              <a:latin typeface="Calibri"/>
+              <a:ea typeface="Calibri"/>
+              <a:cs typeface="Calibri"/>
+              <a:sym typeface="Calibri"/>
+            </a:endParaRPr>
+          </a:p>
+          <a:p>
+            <a:pPr indent="-177800" lvl="0" marL="177800" marR="0" rtl="0" algn="l">
+              <a:lnSpc>
+                <a:spcPct val="100000"/>
+              </a:lnSpc>
+              <a:spcBef>
+                <a:spcPts val="0"/>
+              </a:spcBef>
+              <a:spcAft>
+                <a:spcPts val="0"/>
+              </a:spcAft>
+              <a:buClr>
+                <a:srgbClr val="FFFFFF"/>
+              </a:buClr>
+              <a:buSzPts val="1300"/>
+              <a:buFont typeface="Helvetica Neue"/>
+              <a:buNone/>
+            </a:pPr>
+            <a:r>
+              <a:rPr b="0" i="0" lang="en-US" sz="1300" u="none" cap="none" strike="noStrike">
+                <a:solidFill>
+                  <a:srgbClr val="FFFFFF"/>
+                </a:solidFill>
+                <a:latin typeface="Helvetica Neue"/>
+                <a:ea typeface="Helvetica Neue"/>
+                <a:cs typeface="Helvetica Neue"/>
+                <a:sym typeface="Helvetica Neue"/>
+              </a:rPr>
+              <a:t>Founder &amp; CEO @ Quantia Consulting</a:t>
+            </a:r>
+            <a:endParaRPr b="0" i="0" sz="1800" u="none" cap="none" strike="noStrike">
+              <a:solidFill>
+                <a:srgbClr val="000000"/>
+              </a:solidFill>
+              <a:latin typeface="Calibri"/>
+              <a:ea typeface="Calibri"/>
+              <a:cs typeface="Calibri"/>
+              <a:sym typeface="Calibri"/>
+            </a:endParaRPr>
+          </a:p>
+          <a:p>
+            <a:pPr indent="-177800" lvl="0" marL="177800" marR="0" rtl="0" algn="l">
+              <a:lnSpc>
+                <a:spcPct val="100000"/>
+              </a:lnSpc>
+              <a:spcBef>
+                <a:spcPts val="0"/>
+              </a:spcBef>
+              <a:spcAft>
+                <a:spcPts val="0"/>
+              </a:spcAft>
+              <a:buClr>
+                <a:srgbClr val="FFFFFF"/>
+              </a:buClr>
+              <a:buSzPts val="1300"/>
+              <a:buFont typeface="Helvetica Neue"/>
+              <a:buNone/>
+            </a:pPr>
+            <a:r>
+              <a:rPr b="0" i="0" lang="en-US" sz="1300" u="none" cap="none" strike="noStrike">
+                <a:solidFill>
+                  <a:srgbClr val="FFFFFF"/>
+                </a:solidFill>
+                <a:latin typeface="Helvetica Neue"/>
+                <a:ea typeface="Helvetica Neue"/>
+                <a:cs typeface="Helvetica Neue"/>
+                <a:sym typeface="Helvetica Neue"/>
+              </a:rPr>
+              <a:t>Riccardo Tommasini</a:t>
+            </a:r>
+            <a:endParaRPr b="0" i="0" sz="1400" u="none" cap="none" strike="noStrike">
+              <a:solidFill>
+                <a:srgbClr val="000000"/>
+              </a:solidFill>
+              <a:latin typeface="Calibri"/>
+              <a:ea typeface="Calibri"/>
+              <a:cs typeface="Calibri"/>
+              <a:sym typeface="Calibri"/>
+            </a:endParaRPr>
+          </a:p>
+          <a:p>
+            <a:pPr indent="-100012" lvl="0" marL="100012" marR="0" rtl="0" algn="l">
+              <a:lnSpc>
+                <a:spcPct val="100000"/>
+              </a:lnSpc>
+              <a:spcBef>
+                <a:spcPts val="0"/>
+              </a:spcBef>
+              <a:spcAft>
+                <a:spcPts val="0"/>
+              </a:spcAft>
+              <a:buClr>
+                <a:srgbClr val="FFFFFF"/>
+              </a:buClr>
+              <a:buSzPts val="1300"/>
+              <a:buFont typeface="Helvetica Neue"/>
+              <a:buNone/>
+            </a:pPr>
+            <a:r>
+              <a:rPr b="0" i="0" lang="en-US" sz="1300" u="none" cap="none" strike="noStrike">
+                <a:solidFill>
+                  <a:srgbClr val="FFFFFF"/>
+                </a:solidFill>
+                <a:latin typeface="Helvetica Neue"/>
+                <a:ea typeface="Helvetica Neue"/>
+                <a:cs typeface="Helvetica Neue"/>
+                <a:sym typeface="Helvetica Neue"/>
+              </a:rPr>
+              <a:t>Prof. @ University of Tartu</a:t>
+            </a:r>
+            <a:endParaRPr b="0" i="0" sz="1400" u="none" cap="none" strike="noStrike">
+              <a:solidFill>
+                <a:srgbClr val="000000"/>
+              </a:solidFill>
+              <a:latin typeface="Arial"/>
+              <a:ea typeface="Arial"/>
+              <a:cs typeface="Arial"/>
+              <a:sym typeface="Arial"/>
+            </a:endParaRPr>
           </a:p>
         </p:txBody>
       </p:sp>

</xml_diff>